<commit_message>
Merge Hery's with Yuhang's.
</commit_message>
<xml_diff>
--- a/Final Project_Group 3.pptx
+++ b/Final Project_Group 3.pptx
@@ -204,7 +204,7 @@
             </a:lvl1pPr>
           </a:lstStyle>
           <a:p>
-            <a:endParaRPr lang="en-US" altLang="zh-CN"/>
+            <a:endParaRPr lang="en-US" altLang="zh-CN" dirty="0"/>
           </a:p>
         </p:txBody>
       </p:sp>
@@ -247,7 +247,7 @@
             </a:lvl1pPr>
           </a:lstStyle>
           <a:p>
-            <a:endParaRPr lang="en-US" altLang="zh-CN"/>
+            <a:endParaRPr lang="en-US" altLang="zh-CN" dirty="0"/>
           </a:p>
         </p:txBody>
       </p:sp>
@@ -391,7 +391,7 @@
             </a:lvl1pPr>
           </a:lstStyle>
           <a:p>
-            <a:endParaRPr lang="en-US" altLang="zh-CN"/>
+            <a:endParaRPr lang="en-US" altLang="zh-CN" dirty="0"/>
           </a:p>
         </p:txBody>
       </p:sp>
@@ -439,7 +439,7 @@
               <a:pPr/>
               <a:t>‹#›</a:t>
             </a:fld>
-            <a:endParaRPr lang="en-US" altLang="zh-CN"/>
+            <a:endParaRPr lang="en-US" altLang="zh-CN" dirty="0"/>
           </a:p>
         </p:txBody>
       </p:sp>
@@ -705,7 +705,7 @@
             </a:lvl1pPr>
           </a:lstStyle>
           <a:p>
-            <a:endParaRPr lang="en-US" altLang="zh-CN"/>
+            <a:endParaRPr lang="en-US" altLang="zh-CN" dirty="0"/>
           </a:p>
         </p:txBody>
       </p:sp>
@@ -728,7 +728,7 @@
             </a:lvl1pPr>
           </a:lstStyle>
           <a:p>
-            <a:endParaRPr lang="en-US" altLang="zh-CN"/>
+            <a:endParaRPr lang="en-US" altLang="zh-CN" dirty="0"/>
           </a:p>
         </p:txBody>
       </p:sp>
@@ -756,7 +756,7 @@
               <a:pPr/>
               <a:t>‹#›</a:t>
             </a:fld>
-            <a:endParaRPr lang="en-US" altLang="zh-CN"/>
+            <a:endParaRPr lang="en-US" altLang="zh-CN" dirty="0"/>
           </a:p>
         </p:txBody>
       </p:sp>
@@ -879,7 +879,7 @@
             </a:lvl1pPr>
           </a:lstStyle>
           <a:p>
-            <a:endParaRPr lang="en-US" altLang="zh-CN"/>
+            <a:endParaRPr lang="en-US" altLang="zh-CN" dirty="0"/>
           </a:p>
         </p:txBody>
       </p:sp>
@@ -902,7 +902,7 @@
             </a:lvl1pPr>
           </a:lstStyle>
           <a:p>
-            <a:endParaRPr lang="en-US" altLang="zh-CN"/>
+            <a:endParaRPr lang="en-US" altLang="zh-CN" dirty="0"/>
           </a:p>
         </p:txBody>
       </p:sp>
@@ -930,7 +930,7 @@
               <a:pPr/>
               <a:t>‹#›</a:t>
             </a:fld>
-            <a:endParaRPr lang="en-US" altLang="zh-CN"/>
+            <a:endParaRPr lang="en-US" altLang="zh-CN" dirty="0"/>
           </a:p>
         </p:txBody>
       </p:sp>
@@ -1063,7 +1063,7 @@
             </a:lvl1pPr>
           </a:lstStyle>
           <a:p>
-            <a:endParaRPr lang="en-US" altLang="zh-CN"/>
+            <a:endParaRPr lang="en-US" altLang="zh-CN" dirty="0"/>
           </a:p>
         </p:txBody>
       </p:sp>
@@ -1086,7 +1086,7 @@
             </a:lvl1pPr>
           </a:lstStyle>
           <a:p>
-            <a:endParaRPr lang="en-US" altLang="zh-CN"/>
+            <a:endParaRPr lang="en-US" altLang="zh-CN" dirty="0"/>
           </a:p>
         </p:txBody>
       </p:sp>
@@ -1114,7 +1114,7 @@
               <a:pPr/>
               <a:t>‹#›</a:t>
             </a:fld>
-            <a:endParaRPr lang="en-US" altLang="zh-CN"/>
+            <a:endParaRPr lang="en-US" altLang="zh-CN" dirty="0"/>
           </a:p>
         </p:txBody>
       </p:sp>
@@ -1237,7 +1237,7 @@
             </a:lvl1pPr>
           </a:lstStyle>
           <a:p>
-            <a:endParaRPr lang="en-US" altLang="zh-CN"/>
+            <a:endParaRPr lang="en-US" altLang="zh-CN" dirty="0"/>
           </a:p>
         </p:txBody>
       </p:sp>
@@ -1260,7 +1260,7 @@
             </a:lvl1pPr>
           </a:lstStyle>
           <a:p>
-            <a:endParaRPr lang="en-US" altLang="zh-CN"/>
+            <a:endParaRPr lang="en-US" altLang="zh-CN" dirty="0"/>
           </a:p>
         </p:txBody>
       </p:sp>
@@ -1288,7 +1288,7 @@
               <a:pPr/>
               <a:t>‹#›</a:t>
             </a:fld>
-            <a:endParaRPr lang="en-US" altLang="zh-CN"/>
+            <a:endParaRPr lang="en-US" altLang="zh-CN" dirty="0"/>
           </a:p>
         </p:txBody>
       </p:sp>
@@ -1433,7 +1433,7 @@
             </a:lvl1pPr>
           </a:lstStyle>
           <a:p>
-            <a:endParaRPr lang="en-US" altLang="zh-CN"/>
+            <a:endParaRPr lang="en-US" altLang="zh-CN" dirty="0"/>
           </a:p>
         </p:txBody>
       </p:sp>
@@ -1456,7 +1456,7 @@
             </a:lvl1pPr>
           </a:lstStyle>
           <a:p>
-            <a:endParaRPr lang="en-US" altLang="zh-CN"/>
+            <a:endParaRPr lang="en-US" altLang="zh-CN" dirty="0"/>
           </a:p>
         </p:txBody>
       </p:sp>
@@ -1484,7 +1484,7 @@
               <a:pPr/>
               <a:t>‹#›</a:t>
             </a:fld>
-            <a:endParaRPr lang="en-US" altLang="zh-CN"/>
+            <a:endParaRPr lang="en-US" altLang="zh-CN" dirty="0"/>
           </a:p>
         </p:txBody>
       </p:sp>
@@ -1725,7 +1725,7 @@
             </a:lvl1pPr>
           </a:lstStyle>
           <a:p>
-            <a:endParaRPr lang="en-US" altLang="zh-CN"/>
+            <a:endParaRPr lang="en-US" altLang="zh-CN" dirty="0"/>
           </a:p>
         </p:txBody>
       </p:sp>
@@ -1748,7 +1748,7 @@
             </a:lvl1pPr>
           </a:lstStyle>
           <a:p>
-            <a:endParaRPr lang="en-US" altLang="zh-CN"/>
+            <a:endParaRPr lang="en-US" altLang="zh-CN" dirty="0"/>
           </a:p>
         </p:txBody>
       </p:sp>
@@ -1776,7 +1776,7 @@
               <a:pPr/>
               <a:t>‹#›</a:t>
             </a:fld>
-            <a:endParaRPr lang="en-US" altLang="zh-CN"/>
+            <a:endParaRPr lang="en-US" altLang="zh-CN" dirty="0"/>
           </a:p>
         </p:txBody>
       </p:sp>
@@ -2156,7 +2156,7 @@
             </a:lvl1pPr>
           </a:lstStyle>
           <a:p>
-            <a:endParaRPr lang="en-US" altLang="zh-CN"/>
+            <a:endParaRPr lang="en-US" altLang="zh-CN" dirty="0"/>
           </a:p>
         </p:txBody>
       </p:sp>
@@ -2179,7 +2179,7 @@
             </a:lvl1pPr>
           </a:lstStyle>
           <a:p>
-            <a:endParaRPr lang="en-US" altLang="zh-CN"/>
+            <a:endParaRPr lang="en-US" altLang="zh-CN" dirty="0"/>
           </a:p>
         </p:txBody>
       </p:sp>
@@ -2207,7 +2207,7 @@
               <a:pPr/>
               <a:t>‹#›</a:t>
             </a:fld>
-            <a:endParaRPr lang="en-US" altLang="zh-CN"/>
+            <a:endParaRPr lang="en-US" altLang="zh-CN" dirty="0"/>
           </a:p>
         </p:txBody>
       </p:sp>
@@ -2278,7 +2278,7 @@
             </a:lvl1pPr>
           </a:lstStyle>
           <a:p>
-            <a:endParaRPr lang="en-US" altLang="zh-CN"/>
+            <a:endParaRPr lang="en-US" altLang="zh-CN" dirty="0"/>
           </a:p>
         </p:txBody>
       </p:sp>
@@ -2301,7 +2301,7 @@
             </a:lvl1pPr>
           </a:lstStyle>
           <a:p>
-            <a:endParaRPr lang="en-US" altLang="zh-CN"/>
+            <a:endParaRPr lang="en-US" altLang="zh-CN" dirty="0"/>
           </a:p>
         </p:txBody>
       </p:sp>
@@ -2329,7 +2329,7 @@
               <a:pPr/>
               <a:t>‹#›</a:t>
             </a:fld>
-            <a:endParaRPr lang="en-US" altLang="zh-CN"/>
+            <a:endParaRPr lang="en-US" altLang="zh-CN" dirty="0"/>
           </a:p>
         </p:txBody>
       </p:sp>
@@ -2377,7 +2377,7 @@
             </a:lvl1pPr>
           </a:lstStyle>
           <a:p>
-            <a:endParaRPr lang="en-US" altLang="zh-CN"/>
+            <a:endParaRPr lang="en-US" altLang="zh-CN" dirty="0"/>
           </a:p>
         </p:txBody>
       </p:sp>
@@ -2400,7 +2400,7 @@
             </a:lvl1pPr>
           </a:lstStyle>
           <a:p>
-            <a:endParaRPr lang="en-US" altLang="zh-CN"/>
+            <a:endParaRPr lang="en-US" altLang="zh-CN" dirty="0"/>
           </a:p>
         </p:txBody>
       </p:sp>
@@ -2428,7 +2428,7 @@
               <a:pPr/>
               <a:t>‹#›</a:t>
             </a:fld>
-            <a:endParaRPr lang="en-US" altLang="zh-CN"/>
+            <a:endParaRPr lang="en-US" altLang="zh-CN" dirty="0"/>
           </a:p>
         </p:txBody>
       </p:sp>
@@ -2658,7 +2658,7 @@
             </a:lvl1pPr>
           </a:lstStyle>
           <a:p>
-            <a:endParaRPr lang="en-US" altLang="zh-CN"/>
+            <a:endParaRPr lang="en-US" altLang="zh-CN" dirty="0"/>
           </a:p>
         </p:txBody>
       </p:sp>
@@ -2681,7 +2681,7 @@
             </a:lvl1pPr>
           </a:lstStyle>
           <a:p>
-            <a:endParaRPr lang="en-US" altLang="zh-CN"/>
+            <a:endParaRPr lang="en-US" altLang="zh-CN" dirty="0"/>
           </a:p>
         </p:txBody>
       </p:sp>
@@ -2709,7 +2709,7 @@
               <a:pPr/>
               <a:t>‹#›</a:t>
             </a:fld>
-            <a:endParaRPr lang="en-US" altLang="zh-CN"/>
+            <a:endParaRPr lang="en-US" altLang="zh-CN" dirty="0"/>
           </a:p>
         </p:txBody>
       </p:sp>
@@ -2827,7 +2827,7 @@
             </a:lvl9pPr>
           </a:lstStyle>
           <a:p>
-            <a:endParaRPr lang="en-US"/>
+            <a:endParaRPr lang="en-US" dirty="0"/>
           </a:p>
         </p:txBody>
       </p:sp>
@@ -2915,7 +2915,7 @@
             </a:lvl1pPr>
           </a:lstStyle>
           <a:p>
-            <a:endParaRPr lang="en-US" altLang="zh-CN"/>
+            <a:endParaRPr lang="en-US" altLang="zh-CN" dirty="0"/>
           </a:p>
         </p:txBody>
       </p:sp>
@@ -2938,7 +2938,7 @@
             </a:lvl1pPr>
           </a:lstStyle>
           <a:p>
-            <a:endParaRPr lang="en-US" altLang="zh-CN"/>
+            <a:endParaRPr lang="en-US" altLang="zh-CN" dirty="0"/>
           </a:p>
         </p:txBody>
       </p:sp>
@@ -2966,7 +2966,7 @@
               <a:pPr/>
               <a:t>‹#›</a:t>
             </a:fld>
-            <a:endParaRPr lang="en-US" altLang="zh-CN"/>
+            <a:endParaRPr lang="en-US" altLang="zh-CN" dirty="0"/>
           </a:p>
         </p:txBody>
       </p:sp>
@@ -3158,7 +3158,7 @@
             </a:lvl1pPr>
           </a:lstStyle>
           <a:p>
-            <a:endParaRPr lang="en-US" altLang="zh-CN"/>
+            <a:endParaRPr lang="en-US" altLang="zh-CN" dirty="0"/>
           </a:p>
         </p:txBody>
       </p:sp>
@@ -3203,7 +3203,7 @@
             </a:lvl1pPr>
           </a:lstStyle>
           <a:p>
-            <a:endParaRPr lang="en-US" altLang="zh-CN"/>
+            <a:endParaRPr lang="en-US" altLang="zh-CN" dirty="0"/>
           </a:p>
         </p:txBody>
       </p:sp>
@@ -3253,7 +3253,7 @@
               <a:pPr/>
               <a:t>‹#›</a:t>
             </a:fld>
-            <a:endParaRPr lang="en-US" altLang="zh-CN"/>
+            <a:endParaRPr lang="en-US" altLang="zh-CN" dirty="0"/>
           </a:p>
         </p:txBody>
       </p:sp>
@@ -3677,8 +3677,8 @@
         </p:nvSpPr>
         <p:spPr bwMode="auto">
           <a:xfrm>
-            <a:off x="10091738" y="3317181"/>
-            <a:ext cx="11142960" cy="13320613"/>
+            <a:off x="10091738" y="3317182"/>
+            <a:ext cx="11142960" cy="6557862"/>
           </a:xfrm>
           <a:prstGeom prst="roundRect">
             <a:avLst>
@@ -3776,17 +3776,7 @@
                 <a:latin typeface="Arial" pitchFamily="34" charset="0"/>
                 <a:cs typeface="Arial" pitchFamily="34" charset="0"/>
               </a:rPr>
-              <a:t>DOM-based </a:t>
-            </a:r>
-            <a:r>
-              <a:rPr lang="en-US" sz="6600" baseline="0" dirty="0" smtClean="0">
-                <a:solidFill>
-                  <a:schemeClr val="bg1"/>
-                </a:solidFill>
-                <a:latin typeface="Arial" pitchFamily="34" charset="0"/>
-                <a:cs typeface="Arial" pitchFamily="34" charset="0"/>
-              </a:rPr>
-              <a:t>XSS Filter</a:t>
+              <a:t>DOM-based XSS Filter</a:t>
             </a:r>
           </a:p>
         </p:txBody>
@@ -3852,37 +3842,7 @@
                 <a:latin typeface="Arial" charset="0"/>
                 <a:ea typeface="宋体" pitchFamily="2" charset="-122"/>
               </a:rPr>
-              <a:t>Intercept </a:t>
-            </a:r>
-            <a:r>
-              <a:rPr lang="en-GB" altLang="zh-CN" sz="3000" b="1" baseline="0" dirty="0" smtClean="0">
-                <a:solidFill>
-                  <a:srgbClr val="006699"/>
-                </a:solidFill>
-                <a:latin typeface="Arial" charset="0"/>
-                <a:ea typeface="宋体" pitchFamily="2" charset="-122"/>
-              </a:rPr>
-              <a:t>and </a:t>
-            </a:r>
-            <a:r>
-              <a:rPr lang="en-GB" altLang="zh-CN" sz="3000" b="1" baseline="0" dirty="0" smtClean="0">
-                <a:solidFill>
-                  <a:srgbClr val="006699"/>
-                </a:solidFill>
-                <a:latin typeface="Arial" charset="0"/>
-                <a:ea typeface="宋体" pitchFamily="2" charset="-122"/>
-              </a:rPr>
-              <a:t>handle potential vulnerability with minimal impact on </a:t>
-            </a:r>
-            <a:r>
-              <a:rPr lang="en-GB" altLang="zh-CN" sz="3000" b="1" baseline="0" dirty="0" smtClean="0">
-                <a:solidFill>
-                  <a:srgbClr val="006699"/>
-                </a:solidFill>
-                <a:latin typeface="Arial" charset="0"/>
-                <a:ea typeface="宋体" pitchFamily="2" charset="-122"/>
-              </a:rPr>
-              <a:t>user experience.</a:t>
+              <a:t>Intercept and handle potential vulnerability with minimal impact on user experience.</a:t>
             </a:r>
           </a:p>
           <a:p>
@@ -4001,13 +3961,6 @@
               </a:rPr>
               <a:t>: Compatible with most websites</a:t>
             </a:r>
-            <a:endParaRPr lang="en-AU" altLang="zh-CN" sz="3000" b="1" baseline="0" dirty="0" smtClean="0">
-              <a:solidFill>
-                <a:srgbClr val="006699"/>
-              </a:solidFill>
-              <a:latin typeface="Arial" charset="0"/>
-              <a:ea typeface="宋体" pitchFamily="2" charset="-122"/>
-            </a:endParaRPr>
           </a:p>
           <a:p>
             <a:pPr marL="269074" indent="-269074" algn="just" defTabSz="538147">
@@ -4095,8 +4048,8 @@
         </p:nvSpPr>
         <p:spPr bwMode="auto">
           <a:xfrm>
-            <a:off x="21497504" y="18847594"/>
-            <a:ext cx="8409781" cy="2106116"/>
+            <a:off x="21462204" y="8384184"/>
+            <a:ext cx="8409781" cy="6424810"/>
           </a:xfrm>
           <a:prstGeom prst="rect">
             <a:avLst/>
@@ -4129,8 +4082,15 @@
                 <a:latin typeface="Arial" charset="0"/>
                 <a:ea typeface="宋体" pitchFamily="2" charset="-122"/>
               </a:rPr>
-              <a:t>Future Work</a:t>
-            </a:r>
+              <a:t>Result</a:t>
+            </a:r>
+            <a:endParaRPr lang="en-GB" altLang="zh-CN" sz="3000" b="1" baseline="0" dirty="0" smtClean="0">
+              <a:solidFill>
+                <a:srgbClr val="006699"/>
+              </a:solidFill>
+              <a:latin typeface="Arial" charset="0"/>
+              <a:ea typeface="宋体" pitchFamily="2" charset="-122"/>
+            </a:endParaRPr>
           </a:p>
         </p:txBody>
       </p:sp>
@@ -4174,7 +4134,7 @@
               </a:spcBef>
             </a:pPr>
             <a:r>
-              <a:rPr lang="en-US" altLang="zh-CN" sz="3600" baseline="0" dirty="0" err="1" smtClean="0">
+              <a:rPr lang="en-US" altLang="zh-CN" sz="3600" baseline="0" dirty="0" smtClean="0">
                 <a:solidFill>
                   <a:schemeClr val="bg1"/>
                 </a:solidFill>
@@ -4231,10 +4191,10 @@
                 <a:latin typeface="Arial" charset="0"/>
                 <a:ea typeface="宋体" pitchFamily="2" charset="-122"/>
               </a:rPr>
-              <a:t>Lu </a:t>
-            </a:r>
-            <a:r>
-              <a:rPr lang="en-US" altLang="zh-CN" sz="3600" baseline="0" dirty="0" err="1" smtClean="0">
+              <a:t>Lu Fangjian,</a:t>
+            </a:r>
+            <a:r>
+              <a:rPr lang="zh-CN" altLang="en-US" sz="3600" baseline="0" dirty="0" smtClean="0">
                 <a:solidFill>
                   <a:schemeClr val="bg1"/>
                 </a:solidFill>
@@ -4246,7 +4206,7 @@
                 <a:latin typeface="Arial" charset="0"/>
                 <a:ea typeface="宋体" pitchFamily="2" charset="-122"/>
               </a:rPr>
-              <a:t>Fangjian</a:t>
+              <a:t> </a:t>
             </a:r>
             <a:r>
               <a:rPr lang="en-US" altLang="zh-CN" sz="3600" baseline="0" dirty="0" smtClean="0">
@@ -4261,10 +4221,10 @@
                 <a:latin typeface="Arial" charset="0"/>
                 <a:ea typeface="宋体" pitchFamily="2" charset="-122"/>
               </a:rPr>
-              <a:t>,</a:t>
-            </a:r>
-            <a:r>
-              <a:rPr lang="zh-CN" altLang="en-US" sz="3600" baseline="0" dirty="0" smtClean="0">
+              <a:t>Yang </a:t>
+            </a:r>
+            <a:r>
+              <a:rPr lang="en-US" altLang="zh-CN" sz="3600" baseline="0" dirty="0" smtClean="0">
                 <a:solidFill>
                   <a:schemeClr val="bg1"/>
                 </a:solidFill>
@@ -4276,7 +4236,7 @@
                 <a:latin typeface="Arial" charset="0"/>
                 <a:ea typeface="宋体" pitchFamily="2" charset="-122"/>
               </a:rPr>
-              <a:t> </a:t>
+              <a:t>Yuhang</a:t>
             </a:r>
             <a:r>
               <a:rPr lang="en-US" altLang="zh-CN" sz="3600" baseline="0" dirty="0" smtClean="0">
@@ -4291,10 +4251,10 @@
                 <a:latin typeface="Arial" charset="0"/>
                 <a:ea typeface="宋体" pitchFamily="2" charset="-122"/>
               </a:rPr>
-              <a:t>Yang </a:t>
-            </a:r>
-            <a:r>
-              <a:rPr lang="en-US" altLang="zh-CN" sz="3600" baseline="0" dirty="0" err="1" smtClean="0">
+              <a:t>,</a:t>
+            </a:r>
+            <a:r>
+              <a:rPr lang="zh-CN" altLang="en-US" sz="3600" baseline="0" dirty="0" smtClean="0">
                 <a:solidFill>
                   <a:schemeClr val="bg1"/>
                 </a:solidFill>
@@ -4306,7 +4266,7 @@
                 <a:latin typeface="Arial" charset="0"/>
                 <a:ea typeface="宋体" pitchFamily="2" charset="-122"/>
               </a:rPr>
-              <a:t>Yuhang</a:t>
+              <a:t> </a:t>
             </a:r>
             <a:r>
               <a:rPr lang="en-US" altLang="zh-CN" sz="3600" baseline="0" dirty="0" smtClean="0">
@@ -4321,40 +4281,10 @@
                 <a:latin typeface="Arial" charset="0"/>
                 <a:ea typeface="宋体" pitchFamily="2" charset="-122"/>
               </a:rPr>
-              <a:t>,</a:t>
-            </a:r>
-            <a:r>
-              <a:rPr lang="zh-CN" altLang="en-US" sz="3600" baseline="0" dirty="0" smtClean="0">
-                <a:solidFill>
-                  <a:schemeClr val="bg1"/>
-                </a:solidFill>
-                <a:effectLst>
-                  <a:outerShdw blurRad="38100" dist="38100" dir="2700000" algn="tl">
-                    <a:srgbClr val="000000"/>
-                  </a:outerShdw>
-                </a:effectLst>
-                <a:latin typeface="Arial" charset="0"/>
-                <a:ea typeface="宋体" pitchFamily="2" charset="-122"/>
-              </a:rPr>
-              <a:t> </a:t>
+              <a:t>Yang </a:t>
             </a:r>
             <a:r>
               <a:rPr lang="en-US" altLang="zh-CN" sz="3600" baseline="0" dirty="0" smtClean="0">
-                <a:solidFill>
-                  <a:schemeClr val="bg1"/>
-                </a:solidFill>
-                <a:effectLst>
-                  <a:outerShdw blurRad="38100" dist="38100" dir="2700000" algn="tl">
-                    <a:srgbClr val="000000"/>
-                  </a:outerShdw>
-                </a:effectLst>
-                <a:latin typeface="Arial" charset="0"/>
-                <a:ea typeface="宋体" pitchFamily="2" charset="-122"/>
-              </a:rPr>
-              <a:t>Yang </a:t>
-            </a:r>
-            <a:r>
-              <a:rPr lang="en-US" altLang="zh-CN" sz="3600" baseline="0" dirty="0" err="1" smtClean="0">
                 <a:solidFill>
                   <a:schemeClr val="bg1"/>
                 </a:solidFill>
@@ -4452,17 +4382,7 @@
                 <a:latin typeface="Arial" charset="0"/>
                 <a:ea typeface="宋体" pitchFamily="2" charset="-122"/>
               </a:rPr>
-              <a:t>DOM-based </a:t>
-            </a:r>
-            <a:r>
-              <a:rPr lang="en-AU" altLang="zh-CN" sz="3000" b="1" baseline="0" dirty="0" smtClean="0">
-                <a:solidFill>
-                  <a:srgbClr val="006699"/>
-                </a:solidFill>
-                <a:latin typeface="Arial" charset="0"/>
-                <a:ea typeface="宋体" pitchFamily="2" charset="-122"/>
-              </a:rPr>
-              <a:t>XSS is </a:t>
+              <a:t>DOM-based XSS is </a:t>
             </a:r>
             <a:r>
               <a:rPr lang="en-AU" altLang="zh-CN" sz="3000" b="1" baseline="0" dirty="0" smtClean="0">
@@ -4543,34 +4463,6 @@
                 <a:spcPct val="50000"/>
               </a:spcBef>
             </a:pPr>
-            <a:endParaRPr lang="en-AU" altLang="zh-CN" sz="3000" b="1" baseline="0" dirty="0" smtClean="0">
-              <a:solidFill>
-                <a:srgbClr val="006699"/>
-              </a:solidFill>
-              <a:latin typeface="Arial" charset="0"/>
-              <a:ea typeface="宋体" pitchFamily="2" charset="-122"/>
-            </a:endParaRPr>
-          </a:p>
-          <a:p>
-            <a:pPr marL="230635" indent="-230635" algn="just" defTabSz="538147">
-              <a:spcBef>
-                <a:spcPct val="50000"/>
-              </a:spcBef>
-            </a:pPr>
-            <a:endParaRPr lang="en-AU" altLang="zh-CN" sz="3000" b="1" baseline="0" dirty="0" smtClean="0">
-              <a:solidFill>
-                <a:srgbClr val="006699"/>
-              </a:solidFill>
-              <a:latin typeface="Arial" charset="0"/>
-              <a:ea typeface="宋体" pitchFamily="2" charset="-122"/>
-            </a:endParaRPr>
-          </a:p>
-          <a:p>
-            <a:pPr algn="just" defTabSz="538147">
-              <a:spcBef>
-                <a:spcPct val="50000"/>
-              </a:spcBef>
-            </a:pPr>
             <a:r>
               <a:rPr lang="en-US" altLang="zh-CN" sz="3000" b="1" baseline="0" dirty="0" smtClean="0">
                 <a:solidFill>
@@ -4590,36 +4482,6 @@
                 <a:ea typeface="宋体" pitchFamily="2" charset="-122"/>
               </a:rPr>
             </a:br>
-            <a:r>
-              <a:rPr lang="en-US" altLang="zh-CN" sz="3000" b="1" baseline="0" dirty="0" smtClean="0">
-                <a:solidFill>
-                  <a:srgbClr val="FFC000"/>
-                </a:solidFill>
-                <a:latin typeface="Arial" charset="0"/>
-                <a:ea typeface="宋体" pitchFamily="2" charset="-122"/>
-              </a:rPr>
-              <a:t>Attack is executed entirely </a:t>
-            </a:r>
-            <a:r>
-              <a:rPr lang="en-US" altLang="zh-CN" sz="3000" b="1" baseline="0" dirty="0" smtClean="0">
-                <a:solidFill>
-                  <a:srgbClr val="FFC000"/>
-                </a:solidFill>
-                <a:latin typeface="Arial" charset="0"/>
-                <a:ea typeface="宋体" pitchFamily="2" charset="-122"/>
-              </a:rPr>
-              <a:t>within the </a:t>
-            </a:r>
-            <a:r>
-              <a:rPr lang="en-US" altLang="zh-CN" sz="3000" b="1" baseline="0" dirty="0" smtClean="0">
-                <a:solidFill>
-                  <a:srgbClr val="FFC000"/>
-                </a:solidFill>
-                <a:latin typeface="Arial" charset="0"/>
-                <a:ea typeface="宋体" pitchFamily="2" charset="-122"/>
-              </a:rPr>
-              <a:t>browser!</a:t>
-            </a:r>
             <a:endParaRPr lang="en-AU" altLang="zh-CN" sz="3000" b="1" baseline="0" dirty="0" smtClean="0">
               <a:solidFill>
                 <a:srgbClr val="FFC000"/>
@@ -4635,16 +4497,70 @@
               </a:spcBef>
             </a:pPr>
             <a:r>
-              <a:rPr lang="en-AU" altLang="zh-CN" sz="3000" b="1" baseline="0" dirty="0" smtClean="0">
+              <a:rPr lang="en-US" altLang="zh-CN" sz="4400" b="1" baseline="0" dirty="0">
                 <a:solidFill>
                   <a:srgbClr val="FFC000"/>
                 </a:solidFill>
                 <a:latin typeface="Arial" charset="0"/>
                 <a:ea typeface="宋体" pitchFamily="2" charset="-122"/>
               </a:rPr>
-              <a:t>                             Page makes use of unsafe input!</a:t>
-            </a:r>
-            <a:endParaRPr lang="en-AU" altLang="zh-CN" sz="3000" b="1" baseline="0" dirty="0" smtClean="0">
+              <a:t> </a:t>
+            </a:r>
+            <a:r>
+              <a:rPr lang="en-US" altLang="zh-CN" sz="2000" b="1" baseline="0" dirty="0">
+                <a:solidFill>
+                  <a:srgbClr val="FFC000"/>
+                </a:solidFill>
+                <a:latin typeface="Arial" charset="0"/>
+                <a:ea typeface="宋体" pitchFamily="2" charset="-122"/>
+              </a:rPr>
+              <a:t>The payload is in the client browser resulting in modifying DOM ENV.</a:t>
+            </a:r>
+          </a:p>
+          <a:p>
+            <a:pPr marL="230635" indent="-230635" algn="just" defTabSz="538147">
+              <a:spcBef>
+                <a:spcPct val="50000"/>
+              </a:spcBef>
+            </a:pPr>
+            <a:r>
+              <a:rPr lang="en-US" altLang="zh-CN" sz="2000" b="1" baseline="0" dirty="0">
+                <a:solidFill>
+                  <a:srgbClr val="FFC000"/>
+                </a:solidFill>
+                <a:latin typeface="Arial" charset="0"/>
+                <a:ea typeface="宋体" pitchFamily="2" charset="-122"/>
+              </a:rPr>
+              <a:t>  Attack entirely within the browser in contrast to others depending on</a:t>
+            </a:r>
+          </a:p>
+          <a:p>
+            <a:pPr marL="230635" indent="-230635" algn="just" defTabSz="538147">
+              <a:spcBef>
+                <a:spcPct val="50000"/>
+              </a:spcBef>
+            </a:pPr>
+            <a:r>
+              <a:rPr lang="en-US" altLang="zh-CN" sz="2000" b="1" baseline="0" dirty="0">
+                <a:solidFill>
+                  <a:srgbClr val="FFC000"/>
+                </a:solidFill>
+                <a:latin typeface="Arial" charset="0"/>
+                <a:ea typeface="宋体" pitchFamily="2" charset="-122"/>
+              </a:rPr>
+              <a:t>  server response</a:t>
+            </a:r>
+            <a:r>
+              <a:rPr lang="en-US" altLang="zh-CN" sz="2000" b="1" baseline="0" dirty="0" smtClean="0">
+                <a:solidFill>
+                  <a:srgbClr val="FFC000"/>
+                </a:solidFill>
+                <a:latin typeface="Arial" charset="0"/>
+                <a:ea typeface="宋体" pitchFamily="2" charset="-122"/>
+              </a:rPr>
+              <a:t>.</a:t>
+            </a:r>
+            <a:endParaRPr lang="en-AU" altLang="zh-CN" sz="2000" b="1" baseline="0" dirty="0">
               <a:solidFill>
                 <a:srgbClr val="FFC000"/>
               </a:solidFill>
@@ -4652,20 +4568,6 @@
               <a:ea typeface="宋体" pitchFamily="2" charset="-122"/>
             </a:endParaRPr>
           </a:p>
-          <a:p>
-            <a:pPr marL="230635" indent="-230635" algn="just" defTabSz="538147">
-              <a:spcBef>
-                <a:spcPct val="50000"/>
-              </a:spcBef>
-            </a:pPr>
-            <a:endParaRPr lang="en-AU" altLang="zh-CN" sz="3000" b="1" baseline="0" dirty="0" smtClean="0">
-              <a:solidFill>
-                <a:srgbClr val="006699"/>
-              </a:solidFill>
-              <a:latin typeface="Arial" charset="0"/>
-              <a:ea typeface="宋体" pitchFamily="2" charset="-122"/>
-            </a:endParaRPr>
-          </a:p>
         </p:txBody>
       </p:sp>
       <p:sp>
@@ -4678,7 +4580,7 @@
         </p:nvSpPr>
         <p:spPr bwMode="auto">
           <a:xfrm>
-            <a:off x="21462206" y="12675394"/>
+            <a:off x="21462205" y="14971663"/>
             <a:ext cx="8409781" cy="6016675"/>
           </a:xfrm>
           <a:prstGeom prst="rect">
@@ -4806,280 +4708,8 @@
                 <a:latin typeface="Arial" charset="0"/>
                 <a:ea typeface="宋体" pitchFamily="2" charset="-122"/>
               </a:rPr>
-              <a:t>: </a:t>
-            </a:r>
-            <a:r>
-              <a:rPr lang="en-GB" altLang="zh-CN" sz="2800" b="1" baseline="0" dirty="0" smtClean="0">
-                <a:solidFill>
-                  <a:srgbClr val="006699"/>
-                </a:solidFill>
-                <a:latin typeface="Arial" charset="0"/>
-                <a:ea typeface="宋体" pitchFamily="2" charset="-122"/>
-              </a:rPr>
-              <a:t>Tested </a:t>
-            </a:r>
-            <a:r>
-              <a:rPr lang="en-GB" altLang="zh-CN" sz="2800" b="1" baseline="0" dirty="0" smtClean="0">
-                <a:solidFill>
-                  <a:srgbClr val="006699"/>
-                </a:solidFill>
-                <a:latin typeface="Arial" charset="0"/>
-                <a:ea typeface="宋体" pitchFamily="2" charset="-122"/>
-              </a:rPr>
-              <a:t>with 10 websites</a:t>
-            </a:r>
-          </a:p>
-          <a:p>
-            <a:pPr marL="576587" lvl="1" indent="-269074" algn="l" defTabSz="538147">
-              <a:spcBef>
-                <a:spcPct val="50000"/>
-              </a:spcBef>
-            </a:pPr>
-            <a:r>
-              <a:rPr lang="en-SG" altLang="zh-CN" sz="1600" b="1" baseline="0" dirty="0" smtClean="0">
-                <a:solidFill>
-                  <a:srgbClr val="006699"/>
-                </a:solidFill>
-                <a:latin typeface="Arial" charset="0"/>
-                <a:ea typeface="宋体" pitchFamily="2" charset="-122"/>
-                <a:hlinkClick r:id="rId3"/>
-              </a:rPr>
-              <a:t>https</a:t>
-            </a:r>
-            <a:r>
-              <a:rPr lang="en-SG" altLang="zh-CN" sz="1600" b="1" baseline="0" dirty="0" smtClean="0">
-                <a:solidFill>
-                  <a:srgbClr val="006699"/>
-                </a:solidFill>
-                <a:latin typeface="Arial" charset="0"/>
-                <a:ea typeface="宋体" pitchFamily="2" charset="-122"/>
-                <a:hlinkClick r:id="rId3"/>
-              </a:rPr>
-              <a:t>://www.google.com/</a:t>
-            </a:r>
-            <a:r>
-              <a:rPr lang="en-SG" altLang="zh-CN" sz="1600" b="1" baseline="0" dirty="0" smtClean="0">
-                <a:solidFill>
-                  <a:srgbClr val="006699"/>
-                </a:solidFill>
-                <a:latin typeface="Arial" charset="0"/>
-                <a:ea typeface="宋体" pitchFamily="2" charset="-122"/>
-              </a:rPr>
-              <a:t>      			</a:t>
-            </a:r>
-            <a:r>
-              <a:rPr lang="en-SG" altLang="zh-CN" sz="1600" b="1" baseline="0" dirty="0" smtClean="0">
-                <a:solidFill>
-                  <a:srgbClr val="006699"/>
-                </a:solidFill>
-                <a:latin typeface="Arial" charset="0"/>
-                <a:ea typeface="宋体" pitchFamily="2" charset="-122"/>
-                <a:hlinkClick r:id="rId4"/>
-              </a:rPr>
-              <a:t>https://mail.google.com</a:t>
-            </a:r>
-            <a:endParaRPr lang="en-SG" altLang="zh-CN" sz="1600" b="1" baseline="0" dirty="0" smtClean="0">
-              <a:solidFill>
-                <a:srgbClr val="006699"/>
-              </a:solidFill>
-              <a:latin typeface="Arial" charset="0"/>
-              <a:ea typeface="宋体" pitchFamily="2" charset="-122"/>
-            </a:endParaRPr>
-          </a:p>
-          <a:p>
-            <a:pPr marL="576587" lvl="1" indent="-269074" algn="l" defTabSz="538147">
-              <a:spcBef>
-                <a:spcPct val="50000"/>
-              </a:spcBef>
-            </a:pPr>
-            <a:r>
-              <a:rPr lang="en-SG" altLang="zh-CN" sz="1600" b="1" baseline="0" dirty="0" smtClean="0">
-                <a:solidFill>
-                  <a:srgbClr val="006699"/>
-                </a:solidFill>
-                <a:latin typeface="Arial" charset="0"/>
-                <a:ea typeface="宋体" pitchFamily="2" charset="-122"/>
-                <a:hlinkClick r:id="rId5"/>
-              </a:rPr>
-              <a:t>https://www.facebook.com/</a:t>
-            </a:r>
-            <a:r>
-              <a:rPr lang="en-SG" altLang="zh-CN" sz="1600" b="1" baseline="0" dirty="0" smtClean="0">
-                <a:solidFill>
-                  <a:srgbClr val="006699"/>
-                </a:solidFill>
-                <a:latin typeface="Arial" charset="0"/>
-                <a:ea typeface="宋体" pitchFamily="2" charset="-122"/>
-              </a:rPr>
-              <a:t>  			</a:t>
-            </a:r>
-            <a:r>
-              <a:rPr lang="en-SG" altLang="zh-CN" sz="1600" b="1" baseline="0" dirty="0" smtClean="0">
-                <a:solidFill>
-                  <a:srgbClr val="006699"/>
-                </a:solidFill>
-                <a:latin typeface="Arial" charset="0"/>
-                <a:ea typeface="宋体" pitchFamily="2" charset="-122"/>
-                <a:hlinkClick r:id="rId6"/>
-              </a:rPr>
-              <a:t>https://twitter.com/</a:t>
-            </a:r>
-            <a:endParaRPr lang="en-SG" altLang="zh-CN" sz="1600" b="1" baseline="0" dirty="0" smtClean="0">
-              <a:solidFill>
-                <a:srgbClr val="006699"/>
-              </a:solidFill>
-              <a:latin typeface="Arial" charset="0"/>
-              <a:ea typeface="宋体" pitchFamily="2" charset="-122"/>
-            </a:endParaRPr>
-          </a:p>
-          <a:p>
-            <a:pPr marL="576587" lvl="1" indent="-269074" algn="l" defTabSz="538147">
-              <a:spcBef>
-                <a:spcPct val="50000"/>
-              </a:spcBef>
-            </a:pPr>
-            <a:r>
-              <a:rPr lang="en-SG" altLang="zh-CN" sz="1600" b="1" baseline="0" dirty="0" smtClean="0">
-                <a:solidFill>
-                  <a:srgbClr val="006699"/>
-                </a:solidFill>
-                <a:latin typeface="Arial" charset="0"/>
-                <a:ea typeface="宋体" pitchFamily="2" charset="-122"/>
-                <a:hlinkClick r:id="rId7"/>
-              </a:rPr>
-              <a:t>http://www.wikipedia.org/</a:t>
-            </a:r>
-            <a:r>
-              <a:rPr lang="en-SG" altLang="zh-CN" sz="1600" b="1" baseline="0" dirty="0" smtClean="0">
-                <a:solidFill>
-                  <a:srgbClr val="006699"/>
-                </a:solidFill>
-                <a:latin typeface="Arial" charset="0"/>
-                <a:ea typeface="宋体" pitchFamily="2" charset="-122"/>
-              </a:rPr>
-              <a:t> 			</a:t>
-            </a:r>
-            <a:r>
-              <a:rPr lang="en-SG" altLang="zh-CN" sz="1600" b="1" baseline="0" dirty="0" smtClean="0">
-                <a:solidFill>
-                  <a:srgbClr val="006699"/>
-                </a:solidFill>
-                <a:latin typeface="Arial" charset="0"/>
-                <a:ea typeface="宋体" pitchFamily="2" charset="-122"/>
-                <a:hlinkClick r:id="rId8"/>
-              </a:rPr>
-              <a:t>http://slashdot.org/</a:t>
-            </a:r>
-            <a:endParaRPr lang="en-SG" altLang="zh-CN" sz="1600" b="1" baseline="0" dirty="0" smtClean="0">
-              <a:solidFill>
-                <a:srgbClr val="006699"/>
-              </a:solidFill>
-              <a:latin typeface="Arial" charset="0"/>
-              <a:ea typeface="宋体" pitchFamily="2" charset="-122"/>
-            </a:endParaRPr>
-          </a:p>
-          <a:p>
-            <a:pPr marL="576587" lvl="1" indent="-269074" algn="l" defTabSz="538147">
-              <a:spcBef>
-                <a:spcPct val="50000"/>
-              </a:spcBef>
-            </a:pPr>
-            <a:r>
-              <a:rPr lang="en-SG" altLang="zh-CN" sz="1600" b="1" baseline="0" dirty="0" smtClean="0">
-                <a:solidFill>
-                  <a:srgbClr val="006699"/>
-                </a:solidFill>
-                <a:latin typeface="Arial" charset="0"/>
-                <a:ea typeface="宋体" pitchFamily="2" charset="-122"/>
-                <a:hlinkClick r:id="rId9"/>
-              </a:rPr>
-              <a:t>https://news.ycombinator.com/</a:t>
-            </a:r>
-            <a:r>
-              <a:rPr lang="en-SG" altLang="zh-CN" sz="1600" b="1" baseline="0" dirty="0" smtClean="0">
-                <a:solidFill>
-                  <a:srgbClr val="006699"/>
-                </a:solidFill>
-                <a:latin typeface="Arial" charset="0"/>
-                <a:ea typeface="宋体" pitchFamily="2" charset="-122"/>
-              </a:rPr>
-              <a:t>  		</a:t>
-            </a:r>
-            <a:r>
-              <a:rPr lang="en-SG" altLang="zh-CN" sz="1600" b="1" baseline="0" dirty="0" smtClean="0">
-                <a:solidFill>
-                  <a:srgbClr val="006699"/>
-                </a:solidFill>
-                <a:latin typeface="Arial" charset="0"/>
-                <a:ea typeface="宋体" pitchFamily="2" charset="-122"/>
-                <a:hlinkClick r:id="rId10"/>
-              </a:rPr>
-              <a:t>http://www.yahoo.com/</a:t>
-            </a:r>
-            <a:endParaRPr lang="en-SG" altLang="zh-CN" sz="1600" b="1" baseline="0" dirty="0" smtClean="0">
-              <a:solidFill>
-                <a:srgbClr val="006699"/>
-              </a:solidFill>
-              <a:latin typeface="Arial" charset="0"/>
-              <a:ea typeface="宋体" pitchFamily="2" charset="-122"/>
-            </a:endParaRPr>
-          </a:p>
-          <a:p>
-            <a:pPr marL="576587" lvl="1" indent="-269074" algn="l" defTabSz="538147">
-              <a:spcBef>
-                <a:spcPct val="50000"/>
-              </a:spcBef>
-            </a:pPr>
-            <a:r>
-              <a:rPr lang="en-SG" altLang="zh-CN" sz="1600" b="1" baseline="0" dirty="0" smtClean="0">
-                <a:solidFill>
-                  <a:srgbClr val="006699"/>
-                </a:solidFill>
-                <a:latin typeface="Arial" charset="0"/>
-                <a:ea typeface="宋体" pitchFamily="2" charset="-122"/>
-                <a:hlinkClick r:id="rId11"/>
-              </a:rPr>
-              <a:t>http://www.youtube.com/</a:t>
-            </a:r>
-            <a:r>
-              <a:rPr lang="en-SG" altLang="zh-CN" sz="1600" b="1" baseline="0" dirty="0" smtClean="0">
-                <a:solidFill>
-                  <a:srgbClr val="006699"/>
-                </a:solidFill>
-                <a:latin typeface="Arial" charset="0"/>
-                <a:ea typeface="宋体" pitchFamily="2" charset="-122"/>
-              </a:rPr>
-              <a:t>  			</a:t>
-            </a:r>
-            <a:r>
-              <a:rPr lang="en-SG" altLang="zh-CN" sz="1600" b="1" baseline="0" dirty="0" smtClean="0">
-                <a:solidFill>
-                  <a:srgbClr val="006699"/>
-                </a:solidFill>
-                <a:latin typeface="Arial" charset="0"/>
-                <a:ea typeface="宋体" pitchFamily="2" charset="-122"/>
-                <a:hlinkClick r:id="rId12"/>
-              </a:rPr>
-              <a:t>http://www.amazon.com</a:t>
-            </a:r>
-            <a:r>
-              <a:rPr lang="en-SG" altLang="zh-CN" sz="1600" b="1" baseline="0" dirty="0" smtClean="0">
-                <a:solidFill>
-                  <a:srgbClr val="006699"/>
-                </a:solidFill>
-                <a:latin typeface="Arial" charset="0"/>
-                <a:ea typeface="宋体" pitchFamily="2" charset="-122"/>
-                <a:hlinkClick r:id="rId12"/>
-              </a:rPr>
-              <a:t>/</a:t>
-            </a:r>
-            <a:endParaRPr lang="en-SG" altLang="zh-CN" sz="1600" b="1" baseline="0" dirty="0" smtClean="0">
-              <a:solidFill>
-                <a:srgbClr val="006699"/>
-              </a:solidFill>
-              <a:latin typeface="Arial" charset="0"/>
-              <a:ea typeface="宋体" pitchFamily="2" charset="-122"/>
-            </a:endParaRPr>
+              <a:t>: Tested with 10 websites</a:t>
+            </a:r>
           </a:p>
           <a:p>
             <a:pPr marL="269074" indent="-269074" algn="l" defTabSz="538147">
@@ -5089,6 +4719,54 @@
               <a:buFont typeface="Wingdings" pitchFamily="2" charset="2"/>
               <a:buChar char="§"/>
             </a:pPr>
+            <a:endParaRPr lang="en-GB" altLang="zh-CN" sz="3000" b="1" baseline="0" dirty="0" smtClean="0">
+              <a:solidFill>
+                <a:srgbClr val="FF0000"/>
+              </a:solidFill>
+              <a:latin typeface="Arial" charset="0"/>
+              <a:ea typeface="宋体" pitchFamily="2" charset="-122"/>
+            </a:endParaRPr>
+          </a:p>
+          <a:p>
+            <a:pPr marL="269074" indent="-269074" algn="l" defTabSz="538147">
+              <a:spcBef>
+                <a:spcPct val="50000"/>
+              </a:spcBef>
+              <a:buFont typeface="Wingdings" pitchFamily="2" charset="2"/>
+              <a:buChar char="§"/>
+            </a:pPr>
+            <a:endParaRPr lang="en-GB" altLang="zh-CN" sz="3000" b="1" baseline="0" dirty="0">
+              <a:solidFill>
+                <a:srgbClr val="FF0000"/>
+              </a:solidFill>
+              <a:latin typeface="Arial" charset="0"/>
+              <a:ea typeface="宋体" pitchFamily="2" charset="-122"/>
+            </a:endParaRPr>
+          </a:p>
+          <a:p>
+            <a:pPr marL="269074" indent="-269074" algn="l" defTabSz="538147">
+              <a:spcBef>
+                <a:spcPct val="50000"/>
+              </a:spcBef>
+              <a:buFont typeface="Wingdings" pitchFamily="2" charset="2"/>
+              <a:buChar char="§"/>
+            </a:pPr>
+            <a:endParaRPr lang="en-GB" altLang="zh-CN" sz="3000" b="1" baseline="0" dirty="0" smtClean="0">
+              <a:solidFill>
+                <a:srgbClr val="FF0000"/>
+              </a:solidFill>
+              <a:latin typeface="Arial" charset="0"/>
+              <a:ea typeface="宋体" pitchFamily="2" charset="-122"/>
+            </a:endParaRPr>
+          </a:p>
+          <a:p>
+            <a:pPr marL="269074" indent="-269074" algn="l" defTabSz="538147">
+              <a:spcBef>
+                <a:spcPct val="50000"/>
+              </a:spcBef>
+              <a:buFont typeface="Wingdings" pitchFamily="2" charset="2"/>
+              <a:buChar char="§"/>
+            </a:pPr>
             <a:r>
               <a:rPr lang="en-GB" altLang="zh-CN" sz="3000" b="1" baseline="0" dirty="0" smtClean="0">
                 <a:solidFill>
@@ -5115,663 +4793,6 @@
               </a:solidFill>
               <a:latin typeface="Arial" charset="0"/>
               <a:ea typeface="宋体" pitchFamily="2" charset="-122"/>
-            </a:endParaRPr>
-          </a:p>
-        </p:txBody>
-      </p:sp>
-      <p:sp>
-        <p:nvSpPr>
-          <p:cNvPr id="2589" name="Text Box 541"/>
-          <p:cNvSpPr txBox="1">
-            <a:spLocks noChangeArrowheads="1"/>
-          </p:cNvSpPr>
-          <p:nvPr/>
-        </p:nvSpPr>
-        <p:spPr bwMode="auto">
-          <a:xfrm>
-            <a:off x="10202719" y="3576687"/>
-            <a:ext cx="10744200" cy="12801600"/>
-          </a:xfrm>
-          <a:prstGeom prst="rect">
-            <a:avLst/>
-          </a:prstGeom>
-          <a:solidFill>
-            <a:schemeClr val="bg1"/>
-          </a:solidFill>
-          <a:ln w="9525">
-            <a:noFill/>
-            <a:miter lim="800000"/>
-            <a:headEnd/>
-            <a:tailEnd/>
-          </a:ln>
-          <a:effectLst/>
-        </p:spPr>
-        <p:txBody>
-          <a:bodyPr lIns="268860" tIns="161316" rIns="268860" bIns="268860"/>
-          <a:lstStyle/>
-          <a:p>
-            <a:pPr marL="276548" indent="-276548" algn="just" defTabSz="600077">
-              <a:spcBef>
-                <a:spcPct val="50000"/>
-              </a:spcBef>
-            </a:pPr>
-            <a:r>
-              <a:rPr lang="en-GB" altLang="zh-CN" sz="3000" b="1" baseline="0" dirty="0" smtClean="0">
-                <a:solidFill>
-                  <a:srgbClr val="006699"/>
-                </a:solidFill>
-                <a:latin typeface="Arial" charset="0"/>
-                <a:ea typeface="宋体" pitchFamily="2" charset="-122"/>
-              </a:rPr>
-              <a:t>Our Solution</a:t>
-            </a:r>
-            <a:r>
-              <a:rPr lang="en-GB" altLang="zh-CN" sz="3000" b="1" baseline="0" dirty="0" smtClean="0">
-                <a:solidFill>
-                  <a:srgbClr val="006699"/>
-                </a:solidFill>
-                <a:latin typeface="Arial" charset="0"/>
-                <a:ea typeface="宋体" pitchFamily="2" charset="-122"/>
-              </a:rPr>
-              <a:t>: </a:t>
-            </a:r>
-            <a:r>
-              <a:rPr lang="en-GB" altLang="zh-CN" sz="3000" b="1" baseline="0" dirty="0" smtClean="0">
-                <a:solidFill>
-                  <a:srgbClr val="FFC000"/>
-                </a:solidFill>
-                <a:latin typeface="Arial" charset="0"/>
-                <a:ea typeface="宋体" pitchFamily="2" charset="-122"/>
-              </a:rPr>
-              <a:t>Protect</a:t>
-            </a:r>
-            <a:r>
-              <a:rPr lang="en-GB" altLang="zh-CN" sz="3000" b="1" baseline="0" dirty="0" smtClean="0">
-                <a:solidFill>
-                  <a:srgbClr val="006699"/>
-                </a:solidFill>
-                <a:latin typeface="Arial" charset="0"/>
-                <a:ea typeface="宋体" pitchFamily="2" charset="-122"/>
-              </a:rPr>
-              <a:t> access to unsafe inputs!</a:t>
-            </a:r>
-          </a:p>
-          <a:p>
-            <a:pPr marL="276548" indent="-276548" algn="just" defTabSz="600077">
-              <a:spcBef>
-                <a:spcPct val="50000"/>
-              </a:spcBef>
-            </a:pPr>
-            <a:endParaRPr lang="en-GB" altLang="zh-CN" sz="2400" b="1" baseline="0" dirty="0">
-              <a:solidFill>
-                <a:srgbClr val="006699"/>
-              </a:solidFill>
-              <a:latin typeface="Arial" charset="0"/>
-              <a:ea typeface="宋体" pitchFamily="2" charset="-122"/>
-            </a:endParaRPr>
-          </a:p>
-          <a:p>
-            <a:pPr marL="276548" indent="-276548" algn="just" defTabSz="600077">
-              <a:spcBef>
-                <a:spcPct val="50000"/>
-              </a:spcBef>
-            </a:pPr>
-            <a:endParaRPr lang="en-GB" altLang="zh-CN" sz="2400" b="1" baseline="0" dirty="0" smtClean="0">
-              <a:solidFill>
-                <a:srgbClr val="006699"/>
-              </a:solidFill>
-              <a:latin typeface="Arial" charset="0"/>
-              <a:ea typeface="宋体" pitchFamily="2" charset="-122"/>
-            </a:endParaRPr>
-          </a:p>
-          <a:p>
-            <a:pPr marL="276548" indent="-276548" algn="l" defTabSz="600077">
-              <a:spcBef>
-                <a:spcPct val="50000"/>
-              </a:spcBef>
-            </a:pPr>
-            <a:endParaRPr lang="en-GB" altLang="zh-CN" sz="2400" b="1" baseline="0" dirty="0" smtClean="0">
-              <a:solidFill>
-                <a:srgbClr val="006699"/>
-              </a:solidFill>
-              <a:latin typeface="Arial" charset="0"/>
-              <a:ea typeface="宋体" pitchFamily="2" charset="-122"/>
-            </a:endParaRPr>
-          </a:p>
-          <a:p>
-            <a:pPr marL="342900" indent="-342900" algn="l" defTabSz="600077">
-              <a:spcBef>
-                <a:spcPct val="50000"/>
-              </a:spcBef>
-              <a:buFontTx/>
-              <a:buChar char="-"/>
-            </a:pPr>
-            <a:r>
-              <a:rPr lang="en-GB" altLang="zh-CN" sz="2400" b="1" baseline="0" dirty="0" smtClean="0">
-                <a:solidFill>
-                  <a:srgbClr val="006699"/>
-                </a:solidFill>
-                <a:latin typeface="Arial" charset="0"/>
-                <a:ea typeface="宋体" pitchFamily="2" charset="-122"/>
-              </a:rPr>
-              <a:t>Remove </a:t>
-            </a:r>
-            <a:r>
-              <a:rPr lang="en-GB" altLang="zh-CN" sz="2400" b="1" baseline="0" dirty="0" err="1" smtClean="0">
-                <a:solidFill>
-                  <a:srgbClr val="006699"/>
-                </a:solidFill>
-                <a:latin typeface="Arial" charset="0"/>
-                <a:ea typeface="宋体" pitchFamily="2" charset="-122"/>
-              </a:rPr>
-              <a:t>Referer</a:t>
-            </a:r>
-            <a:r>
-              <a:rPr lang="en-GB" altLang="zh-CN" sz="2400" b="1" baseline="0" dirty="0" smtClean="0">
-                <a:solidFill>
-                  <a:srgbClr val="006699"/>
-                </a:solidFill>
-                <a:latin typeface="Arial" charset="0"/>
-                <a:ea typeface="宋体" pitchFamily="2" charset="-122"/>
-              </a:rPr>
-              <a:t> from HTTP header</a:t>
-            </a:r>
-          </a:p>
-          <a:p>
-            <a:pPr marL="650413" lvl="1" indent="-342900" algn="l" defTabSz="600077">
-              <a:spcBef>
-                <a:spcPct val="50000"/>
-              </a:spcBef>
-              <a:buFontTx/>
-              <a:buChar char="-"/>
-            </a:pPr>
-            <a:r>
-              <a:rPr lang="en-GB" altLang="zh-CN" sz="2400" b="1" baseline="0" dirty="0" smtClean="0">
-                <a:solidFill>
-                  <a:srgbClr val="006699"/>
-                </a:solidFill>
-                <a:latin typeface="Arial" charset="0"/>
-                <a:ea typeface="宋体" pitchFamily="2" charset="-122"/>
-              </a:rPr>
-              <a:t>Intercept and remove by </a:t>
-            </a:r>
-            <a:r>
-              <a:rPr lang="en-GB" altLang="zh-CN" sz="2400" b="1" baseline="0" dirty="0" err="1" smtClean="0">
-                <a:solidFill>
-                  <a:srgbClr val="006699"/>
-                </a:solidFill>
-                <a:latin typeface="Arial" charset="0"/>
-                <a:ea typeface="宋体" pitchFamily="2" charset="-122"/>
-              </a:rPr>
-              <a:t>chrome.webRequest</a:t>
-            </a:r>
-            <a:r>
-              <a:rPr lang="en-GB" altLang="zh-CN" sz="2400" b="1" baseline="0" dirty="0" smtClean="0">
-                <a:solidFill>
-                  <a:srgbClr val="006699"/>
-                </a:solidFill>
-                <a:latin typeface="Arial" charset="0"/>
-                <a:ea typeface="宋体" pitchFamily="2" charset="-122"/>
-              </a:rPr>
-              <a:t> API</a:t>
-            </a:r>
-          </a:p>
-          <a:p>
-            <a:pPr marL="342900" indent="-342900" algn="l" defTabSz="600077">
-              <a:spcBef>
-                <a:spcPct val="50000"/>
-              </a:spcBef>
-              <a:buFontTx/>
-              <a:buChar char="-"/>
-            </a:pPr>
-            <a:r>
-              <a:rPr lang="en-GB" altLang="zh-CN" sz="2400" b="1" baseline="0" dirty="0" smtClean="0">
-                <a:solidFill>
-                  <a:srgbClr val="006699"/>
-                </a:solidFill>
-                <a:latin typeface="Arial" charset="0"/>
-                <a:ea typeface="宋体" pitchFamily="2" charset="-122"/>
-              </a:rPr>
-              <a:t>Protect access to unsafe inputs: encode the return value.</a:t>
-            </a:r>
-            <a:br>
-              <a:rPr lang="en-GB" altLang="zh-CN" sz="2400" b="1" baseline="0" dirty="0" smtClean="0">
-                <a:solidFill>
-                  <a:srgbClr val="006699"/>
-                </a:solidFill>
-                <a:latin typeface="Arial" charset="0"/>
-                <a:ea typeface="宋体" pitchFamily="2" charset="-122"/>
-              </a:rPr>
-            </a:br>
-            <a:endParaRPr lang="en-GB" altLang="zh-CN" sz="2400" b="1" baseline="0" dirty="0" smtClean="0">
-              <a:solidFill>
-                <a:srgbClr val="006699"/>
-              </a:solidFill>
-              <a:latin typeface="Arial" charset="0"/>
-              <a:ea typeface="宋体" pitchFamily="2" charset="-122"/>
-            </a:endParaRPr>
-          </a:p>
-          <a:p>
-            <a:pPr marL="342900" indent="-342900" algn="l" defTabSz="600077">
-              <a:spcBef>
-                <a:spcPct val="50000"/>
-              </a:spcBef>
-              <a:buFontTx/>
-              <a:buChar char="-"/>
-            </a:pPr>
-            <a:endParaRPr lang="en-GB" altLang="zh-CN" sz="2400" b="1" baseline="0" dirty="0">
-              <a:solidFill>
-                <a:srgbClr val="006699"/>
-              </a:solidFill>
-              <a:latin typeface="Arial" charset="0"/>
-              <a:ea typeface="宋体" pitchFamily="2" charset="-122"/>
-            </a:endParaRPr>
-          </a:p>
-          <a:p>
-            <a:pPr marL="342900" indent="-342900" algn="l" defTabSz="600077">
-              <a:spcBef>
-                <a:spcPct val="50000"/>
-              </a:spcBef>
-              <a:buFontTx/>
-              <a:buChar char="-"/>
-            </a:pPr>
-            <a:endParaRPr lang="en-GB" altLang="zh-CN" sz="2400" b="1" baseline="0" dirty="0" smtClean="0">
-              <a:solidFill>
-                <a:srgbClr val="006699"/>
-              </a:solidFill>
-              <a:latin typeface="Arial" charset="0"/>
-              <a:ea typeface="宋体" pitchFamily="2" charset="-122"/>
-            </a:endParaRPr>
-          </a:p>
-          <a:p>
-            <a:pPr marL="342900" indent="-342900" algn="l" defTabSz="600077">
-              <a:spcBef>
-                <a:spcPct val="50000"/>
-              </a:spcBef>
-              <a:buFontTx/>
-              <a:buChar char="-"/>
-            </a:pPr>
-            <a:endParaRPr lang="en-GB" altLang="zh-CN" sz="2400" b="1" baseline="0" dirty="0">
-              <a:solidFill>
-                <a:srgbClr val="006699"/>
-              </a:solidFill>
-              <a:latin typeface="Arial" charset="0"/>
-              <a:ea typeface="宋体" pitchFamily="2" charset="-122"/>
-            </a:endParaRPr>
-          </a:p>
-          <a:p>
-            <a:pPr marL="342900" indent="-342900" algn="l" defTabSz="600077">
-              <a:spcBef>
-                <a:spcPct val="50000"/>
-              </a:spcBef>
-              <a:buFontTx/>
-              <a:buChar char="-"/>
-            </a:pPr>
-            <a:endParaRPr lang="en-GB" altLang="zh-CN" sz="2400" b="1" baseline="0" dirty="0" smtClean="0">
-              <a:solidFill>
-                <a:srgbClr val="006699"/>
-              </a:solidFill>
-              <a:latin typeface="Arial" charset="0"/>
-              <a:ea typeface="宋体" pitchFamily="2" charset="-122"/>
-            </a:endParaRPr>
-          </a:p>
-          <a:p>
-            <a:pPr marL="342900" indent="-342900" algn="l" defTabSz="600077">
-              <a:spcBef>
-                <a:spcPct val="50000"/>
-              </a:spcBef>
-              <a:buFontTx/>
-              <a:buChar char="-"/>
-            </a:pPr>
-            <a:endParaRPr lang="en-GB" altLang="zh-CN" sz="2400" b="1" baseline="0" dirty="0">
-              <a:solidFill>
-                <a:srgbClr val="006699"/>
-              </a:solidFill>
-              <a:latin typeface="Arial" charset="0"/>
-              <a:ea typeface="宋体" pitchFamily="2" charset="-122"/>
-            </a:endParaRPr>
-          </a:p>
-          <a:p>
-            <a:pPr marL="650413" lvl="1" indent="-342900" algn="l" defTabSz="600077">
-              <a:spcBef>
-                <a:spcPct val="50000"/>
-              </a:spcBef>
-              <a:buFontTx/>
-              <a:buChar char="-"/>
-            </a:pPr>
-            <a:r>
-              <a:rPr lang="en-GB" altLang="zh-CN" sz="2400" b="1" baseline="0" dirty="0" smtClean="0">
-                <a:solidFill>
-                  <a:srgbClr val="006699"/>
-                </a:solidFill>
-                <a:latin typeface="Arial" charset="0"/>
-                <a:ea typeface="宋体" pitchFamily="2" charset="-122"/>
-              </a:rPr>
-              <a:t>Chrome Content Script</a:t>
-            </a:r>
-          </a:p>
-          <a:p>
-            <a:pPr marL="957925" lvl="2" indent="-342900" algn="l" defTabSz="600077">
-              <a:spcBef>
-                <a:spcPct val="50000"/>
-              </a:spcBef>
-              <a:buFontTx/>
-              <a:buChar char="-"/>
-            </a:pPr>
-            <a:r>
-              <a:rPr lang="en-GB" altLang="zh-CN" sz="2400" b="1" baseline="0" dirty="0" smtClean="0">
-                <a:solidFill>
-                  <a:srgbClr val="006699"/>
-                </a:solidFill>
-                <a:latin typeface="Arial" charset="0"/>
-                <a:ea typeface="宋体" pitchFamily="2" charset="-122"/>
-              </a:rPr>
-              <a:t>Before DOM objects are constructed, inject small amount of JavaScript to…</a:t>
-            </a:r>
-          </a:p>
-          <a:p>
-            <a:pPr marL="1265438" lvl="3" indent="-342900" algn="l" defTabSz="600077">
-              <a:spcBef>
-                <a:spcPct val="50000"/>
-              </a:spcBef>
-              <a:buFontTx/>
-              <a:buChar char="-"/>
-            </a:pPr>
-            <a:r>
-              <a:rPr lang="en-SG" altLang="zh-CN" sz="2400" b="1" baseline="0" dirty="0" smtClean="0">
-                <a:solidFill>
-                  <a:srgbClr val="006699"/>
-                </a:solidFill>
-                <a:latin typeface="Arial" charset="0"/>
-                <a:ea typeface="宋体" pitchFamily="2" charset="-122"/>
-              </a:rPr>
-              <a:t>Override </a:t>
-            </a:r>
-            <a:r>
-              <a:rPr lang="en-SG" altLang="zh-CN" sz="2400" b="1" baseline="0" dirty="0" smtClean="0">
-                <a:solidFill>
-                  <a:srgbClr val="006699"/>
-                </a:solidFill>
-                <a:latin typeface="Courier New" pitchFamily="49" charset="0"/>
-                <a:ea typeface="宋体" pitchFamily="2" charset="-122"/>
-                <a:cs typeface="Courier New" pitchFamily="49" charset="0"/>
-              </a:rPr>
-              <a:t>document.URL</a:t>
-            </a:r>
-            <a:r>
-              <a:rPr lang="en-SG" altLang="zh-CN" sz="2400" b="1" baseline="0" dirty="0" smtClean="0">
-                <a:solidFill>
-                  <a:srgbClr val="006699"/>
-                </a:solidFill>
-                <a:latin typeface="Arial" charset="0"/>
-                <a:ea typeface="宋体" pitchFamily="2" charset="-122"/>
-              </a:rPr>
-              <a:t> getter</a:t>
-            </a:r>
-            <a:endParaRPr lang="en-GB" altLang="zh-CN" sz="2400" b="1" baseline="0" dirty="0">
-              <a:solidFill>
-                <a:srgbClr val="006699"/>
-              </a:solidFill>
-              <a:latin typeface="Arial" charset="0"/>
-              <a:ea typeface="宋体" pitchFamily="2" charset="-122"/>
-            </a:endParaRPr>
-          </a:p>
-          <a:p>
-            <a:pPr marL="1265438" lvl="3" indent="-342900" algn="l" defTabSz="600077">
-              <a:spcBef>
-                <a:spcPct val="50000"/>
-              </a:spcBef>
-              <a:buFontTx/>
-              <a:buChar char="-"/>
-            </a:pPr>
-            <a:r>
-              <a:rPr lang="en-SG" altLang="zh-CN" sz="2400" b="1" baseline="0" dirty="0" smtClean="0">
-                <a:solidFill>
-                  <a:srgbClr val="006699"/>
-                </a:solidFill>
-                <a:latin typeface="Arial" charset="0"/>
-                <a:ea typeface="宋体" pitchFamily="2" charset="-122"/>
-              </a:rPr>
-              <a:t>Override </a:t>
-            </a:r>
-            <a:r>
-              <a:rPr lang="en-SG" altLang="zh-CN" sz="2400" b="1" baseline="0" dirty="0" err="1" smtClean="0">
-                <a:solidFill>
-                  <a:srgbClr val="006699"/>
-                </a:solidFill>
-                <a:latin typeface="Courier New" pitchFamily="49" charset="0"/>
-                <a:ea typeface="宋体" pitchFamily="2" charset="-122"/>
-                <a:cs typeface="Courier New" pitchFamily="49" charset="0"/>
-              </a:rPr>
-              <a:t>document.URLUnencoded</a:t>
-            </a:r>
-            <a:r>
-              <a:rPr lang="en-SG" altLang="zh-CN" sz="2400" b="1" baseline="0" dirty="0" smtClean="0">
-                <a:solidFill>
-                  <a:srgbClr val="006699"/>
-                </a:solidFill>
-                <a:latin typeface="Arial" charset="0"/>
-                <a:ea typeface="宋体" pitchFamily="2" charset="-122"/>
-              </a:rPr>
-              <a:t> getter</a:t>
-            </a:r>
-          </a:p>
-          <a:p>
-            <a:pPr marL="1265438" lvl="3" indent="-342900" algn="l" defTabSz="600077">
-              <a:spcBef>
-                <a:spcPct val="50000"/>
-              </a:spcBef>
-              <a:buFontTx/>
-              <a:buChar char="-"/>
-            </a:pPr>
-            <a:r>
-              <a:rPr lang="en-SG" altLang="zh-CN" sz="2400" b="1" baseline="0" dirty="0" smtClean="0">
-                <a:solidFill>
-                  <a:srgbClr val="006699"/>
-                </a:solidFill>
-                <a:latin typeface="Arial" charset="0"/>
-                <a:ea typeface="宋体" pitchFamily="2" charset="-122"/>
-              </a:rPr>
-              <a:t>Protect </a:t>
-            </a:r>
-            <a:r>
-              <a:rPr lang="en-SG" altLang="zh-CN" sz="2400" b="1" baseline="0" dirty="0" err="1" smtClean="0">
-                <a:solidFill>
-                  <a:srgbClr val="006699"/>
-                </a:solidFill>
-                <a:latin typeface="Courier New" pitchFamily="49" charset="0"/>
-                <a:ea typeface="宋体" pitchFamily="2" charset="-122"/>
-                <a:cs typeface="Courier New" pitchFamily="49" charset="0"/>
-              </a:rPr>
-              <a:t>document.location</a:t>
-            </a:r>
-            <a:r>
-              <a:rPr lang="en-SG" altLang="zh-CN" sz="2400" b="1" baseline="0" dirty="0" smtClean="0">
-                <a:solidFill>
-                  <a:srgbClr val="006699"/>
-                </a:solidFill>
-                <a:latin typeface="Arial" charset="0"/>
-                <a:ea typeface="宋体" pitchFamily="2" charset="-122"/>
-              </a:rPr>
-              <a:t>:</a:t>
-            </a:r>
-          </a:p>
-          <a:p>
-            <a:pPr marL="1572951" lvl="4" indent="-342900" algn="l" defTabSz="600077">
-              <a:spcBef>
-                <a:spcPct val="50000"/>
-              </a:spcBef>
-              <a:buFontTx/>
-              <a:buChar char="-"/>
-            </a:pPr>
-            <a:r>
-              <a:rPr lang="en-SG" altLang="zh-CN" sz="2400" b="1" baseline="0" dirty="0" err="1" smtClean="0">
-                <a:solidFill>
-                  <a:srgbClr val="006699"/>
-                </a:solidFill>
-                <a:latin typeface="Courier New" pitchFamily="49" charset="0"/>
-                <a:ea typeface="宋体" pitchFamily="2" charset="-122"/>
-                <a:cs typeface="Courier New" pitchFamily="49" charset="0"/>
-              </a:rPr>
-              <a:t>document.location.search</a:t>
-            </a:r>
-            <a:r>
-              <a:rPr lang="en-SG" altLang="zh-CN" sz="2400" b="1" baseline="0" dirty="0" smtClean="0">
-                <a:solidFill>
-                  <a:srgbClr val="006699"/>
-                </a:solidFill>
-                <a:latin typeface="Arial" charset="0"/>
-                <a:ea typeface="宋体" pitchFamily="2" charset="-122"/>
-              </a:rPr>
-              <a:t> </a:t>
-            </a:r>
-            <a:r>
-              <a:rPr lang="en-SG" altLang="zh-CN" sz="2400" b="1" baseline="0" dirty="0" smtClean="0">
-                <a:solidFill>
-                  <a:srgbClr val="006699"/>
-                </a:solidFill>
-                <a:latin typeface="Arial" charset="0"/>
-                <a:ea typeface="宋体" pitchFamily="2" charset="-122"/>
-              </a:rPr>
-              <a:t>already </a:t>
-            </a:r>
-            <a:r>
-              <a:rPr lang="en-SG" altLang="zh-CN" sz="2400" b="1" baseline="0" dirty="0" smtClean="0">
-                <a:solidFill>
-                  <a:srgbClr val="006699"/>
-                </a:solidFill>
-                <a:latin typeface="Arial" charset="0"/>
-                <a:ea typeface="宋体" pitchFamily="2" charset="-122"/>
-              </a:rPr>
-              <a:t>encoded</a:t>
-            </a:r>
-          </a:p>
-          <a:p>
-            <a:pPr marL="1572951" lvl="4" indent="-342900" algn="l" defTabSz="600077">
-              <a:spcBef>
-                <a:spcPct val="50000"/>
-              </a:spcBef>
-              <a:buFontTx/>
-              <a:buChar char="-"/>
-            </a:pPr>
-            <a:r>
-              <a:rPr lang="en-SG" altLang="zh-CN" sz="2400" b="1" baseline="0" dirty="0">
-                <a:solidFill>
-                  <a:srgbClr val="006699"/>
-                </a:solidFill>
-                <a:latin typeface="Arial" charset="0"/>
-                <a:ea typeface="宋体" pitchFamily="2" charset="-122"/>
-              </a:rPr>
-              <a:t>O</a:t>
-            </a:r>
-            <a:r>
-              <a:rPr lang="en-SG" altLang="zh-CN" sz="2400" b="1" baseline="0" dirty="0" smtClean="0">
-                <a:solidFill>
-                  <a:srgbClr val="006699"/>
-                </a:solidFill>
-                <a:latin typeface="Arial" charset="0"/>
-                <a:ea typeface="宋体" pitchFamily="2" charset="-122"/>
-              </a:rPr>
-              <a:t>verride </a:t>
-            </a:r>
-            <a:r>
-              <a:rPr lang="en-SG" altLang="zh-CN" sz="2400" b="1" baseline="0" dirty="0" err="1" smtClean="0">
-                <a:solidFill>
-                  <a:srgbClr val="006699"/>
-                </a:solidFill>
-                <a:latin typeface="Courier New" pitchFamily="49" charset="0"/>
-                <a:ea typeface="宋体" pitchFamily="2" charset="-122"/>
-                <a:cs typeface="Courier New" pitchFamily="49" charset="0"/>
-              </a:rPr>
-              <a:t>document.location.hash</a:t>
-            </a:r>
-            <a:r>
-              <a:rPr lang="en-SG" altLang="zh-CN" sz="2400" b="1" baseline="0" dirty="0" smtClean="0">
-                <a:solidFill>
-                  <a:srgbClr val="006699"/>
-                </a:solidFill>
-                <a:latin typeface="Arial" charset="0"/>
-                <a:ea typeface="宋体" pitchFamily="2" charset="-122"/>
-              </a:rPr>
-              <a:t> getter</a:t>
-            </a:r>
-          </a:p>
-          <a:p>
-            <a:pPr marL="1265438" lvl="3" indent="-342900" algn="l" defTabSz="600077">
-              <a:spcBef>
-                <a:spcPct val="50000"/>
-              </a:spcBef>
-              <a:buFontTx/>
-              <a:buChar char="-"/>
-            </a:pPr>
-            <a:r>
-              <a:rPr lang="en-SG" altLang="zh-CN" sz="2400" b="1" baseline="0" dirty="0" smtClean="0">
-                <a:solidFill>
-                  <a:srgbClr val="006699"/>
-                </a:solidFill>
-                <a:latin typeface="Arial" charset="0"/>
-                <a:ea typeface="宋体" pitchFamily="2" charset="-122"/>
-              </a:rPr>
-              <a:t>Override </a:t>
-            </a:r>
-            <a:r>
-              <a:rPr lang="en-SG" altLang="zh-CN" sz="2400" b="1" baseline="0" dirty="0" smtClean="0">
-                <a:solidFill>
-                  <a:srgbClr val="006699"/>
-                </a:solidFill>
-                <a:latin typeface="Courier New" pitchFamily="49" charset="0"/>
-                <a:ea typeface="宋体" pitchFamily="2" charset="-122"/>
-                <a:cs typeface="Courier New" pitchFamily="49" charset="0"/>
-              </a:rPr>
-              <a:t>window.name </a:t>
-            </a:r>
-            <a:r>
-              <a:rPr lang="en-SG" altLang="zh-CN" sz="2400" b="1" baseline="0" dirty="0" smtClean="0">
-                <a:solidFill>
-                  <a:srgbClr val="006699"/>
-                </a:solidFill>
-                <a:latin typeface="Arial" charset="0"/>
-                <a:ea typeface="宋体" pitchFamily="2" charset="-122"/>
-              </a:rPr>
-              <a:t>getter</a:t>
-            </a:r>
-          </a:p>
-          <a:p>
-            <a:pPr marL="1265438" lvl="3" indent="-342900" algn="l" defTabSz="600077">
-              <a:spcBef>
-                <a:spcPct val="50000"/>
-              </a:spcBef>
-              <a:buFontTx/>
-              <a:buChar char="-"/>
-            </a:pPr>
-            <a:r>
-              <a:rPr lang="en-SG" altLang="zh-CN" sz="2400" b="1" baseline="0" dirty="0" smtClean="0">
-                <a:solidFill>
-                  <a:srgbClr val="006699"/>
-                </a:solidFill>
-                <a:latin typeface="Arial" charset="0"/>
-                <a:ea typeface="宋体" pitchFamily="2" charset="-122"/>
-              </a:rPr>
-              <a:t>Force encode </a:t>
-            </a:r>
-            <a:r>
-              <a:rPr lang="en-SG" altLang="zh-CN" sz="2400" b="1" baseline="0" dirty="0" err="1" smtClean="0">
-                <a:solidFill>
-                  <a:srgbClr val="006699"/>
-                </a:solidFill>
-                <a:latin typeface="Courier New" pitchFamily="49" charset="0"/>
-                <a:ea typeface="宋体" pitchFamily="2" charset="-122"/>
-                <a:cs typeface="Courier New" pitchFamily="49" charset="0"/>
-              </a:rPr>
-              <a:t>window.location.hash</a:t>
-            </a:r>
-            <a:endParaRPr lang="en-GB" altLang="zh-CN" sz="2400" b="1" baseline="0" dirty="0" smtClean="0">
-              <a:solidFill>
-                <a:srgbClr val="006699"/>
-              </a:solidFill>
-              <a:latin typeface="Courier New" pitchFamily="49" charset="0"/>
-              <a:ea typeface="宋体" pitchFamily="2" charset="-122"/>
-              <a:cs typeface="Courier New" pitchFamily="49" charset="0"/>
             </a:endParaRPr>
           </a:p>
         </p:txBody>
@@ -5820,7 +4841,27 @@
                 <a:latin typeface="Arial" charset="0"/>
                 <a:ea typeface="宋体" pitchFamily="2" charset="-122"/>
               </a:rPr>
-              <a:t>Web Apps Trends</a:t>
+              <a:t>Web </a:t>
+            </a:r>
+            <a:r>
+              <a:rPr lang="en-GB" altLang="zh-CN" sz="3000" b="1" baseline="0" dirty="0" smtClean="0">
+                <a:solidFill>
+                  <a:srgbClr val="006699"/>
+                </a:solidFill>
+                <a:latin typeface="Arial" charset="0"/>
+                <a:ea typeface="宋体" pitchFamily="2" charset="-122"/>
+              </a:rPr>
+              <a:t>Apps Attack </a:t>
+            </a:r>
+            <a:r>
+              <a:rPr lang="en-GB" altLang="zh-CN" sz="3000" b="1" baseline="0" dirty="0" smtClean="0">
+                <a:solidFill>
+                  <a:srgbClr val="006699"/>
+                </a:solidFill>
+                <a:latin typeface="Arial" charset="0"/>
+                <a:ea typeface="宋体" pitchFamily="2" charset="-122"/>
+              </a:rPr>
+              <a:t>Trends</a:t>
             </a:r>
           </a:p>
         </p:txBody>
@@ -5836,7 +4877,7 @@
         <p:spPr bwMode="auto">
           <a:xfrm>
             <a:off x="21497504" y="3317181"/>
-            <a:ext cx="8409781" cy="9205813"/>
+            <a:ext cx="8409781" cy="4862413"/>
           </a:xfrm>
           <a:prstGeom prst="rect">
             <a:avLst/>
@@ -5856,21 +4897,207 @@
           <a:bodyPr lIns="268860" tIns="161316" rIns="268860" bIns="268860"/>
           <a:lstStyle/>
           <a:p>
+            <a:pPr marL="276548" indent="-276548" algn="l" defTabSz="600077">
+              <a:spcBef>
+                <a:spcPct val="50000"/>
+              </a:spcBef>
+            </a:pPr>
+            <a:r>
+              <a:rPr lang="en-GB" altLang="zh-CN" sz="3000" b="1" baseline="0" dirty="0">
+                <a:solidFill>
+                  <a:srgbClr val="006699"/>
+                </a:solidFill>
+                <a:latin typeface="Arial" charset="0"/>
+                <a:ea typeface="宋体" pitchFamily="2" charset="-122"/>
+              </a:rPr>
+              <a:t>Implementation</a:t>
+            </a:r>
+          </a:p>
+          <a:p>
+            <a:pPr marL="276548" indent="-276548" algn="l" defTabSz="600077">
+              <a:spcBef>
+                <a:spcPct val="50000"/>
+              </a:spcBef>
+              <a:buFont typeface="Wingdings" pitchFamily="2" charset="2"/>
+              <a:buChar char="§"/>
+            </a:pPr>
+            <a:r>
+              <a:rPr lang="en-GB" altLang="zh-CN" sz="2400" b="1" baseline="0" dirty="0">
+                <a:solidFill>
+                  <a:srgbClr val="006699"/>
+                </a:solidFill>
+                <a:latin typeface="Arial" charset="0"/>
+                <a:ea typeface="宋体" pitchFamily="2" charset="-122"/>
+              </a:rPr>
+              <a:t> Browser</a:t>
+            </a:r>
+          </a:p>
+          <a:p>
+            <a:pPr marL="584061" lvl="1" indent="-276548" algn="l" defTabSz="600077">
+              <a:spcBef>
+                <a:spcPct val="50000"/>
+              </a:spcBef>
+              <a:buFont typeface="Wingdings" pitchFamily="2" charset="2"/>
+              <a:buChar char="§"/>
+            </a:pPr>
+            <a:r>
+              <a:rPr lang="en-GB" altLang="zh-CN" sz="2400" b="1" baseline="0" dirty="0">
+                <a:solidFill>
+                  <a:srgbClr val="006699"/>
+                </a:solidFill>
+                <a:latin typeface="Arial" charset="0"/>
+                <a:ea typeface="宋体" pitchFamily="2" charset="-122"/>
+              </a:rPr>
+              <a:t>Google </a:t>
+            </a:r>
+            <a:r>
+              <a:rPr lang="en-GB" altLang="zh-CN" sz="2400" b="1" baseline="0" dirty="0" smtClean="0">
+                <a:solidFill>
+                  <a:srgbClr val="006699"/>
+                </a:solidFill>
+                <a:latin typeface="Arial" charset="0"/>
+                <a:ea typeface="宋体" pitchFamily="2" charset="-122"/>
+              </a:rPr>
+              <a:t>Chrome </a:t>
+            </a:r>
+            <a:r>
+              <a:rPr lang="en-SG" altLang="zh-CN" sz="2400" b="1" baseline="0" dirty="0" smtClean="0">
+                <a:solidFill>
+                  <a:srgbClr val="006699"/>
+                </a:solidFill>
+                <a:latin typeface="Arial" charset="0"/>
+                <a:ea typeface="宋体" pitchFamily="2" charset="-122"/>
+              </a:rPr>
+              <a:t>version</a:t>
+            </a:r>
+            <a:r>
+              <a:rPr lang="en-SG" sz="2400" dirty="0" smtClean="0"/>
+              <a:t> </a:t>
+            </a:r>
+            <a:r>
+              <a:rPr lang="en-SG" altLang="zh-CN" sz="2400" b="1" baseline="0" dirty="0" smtClean="0">
+                <a:solidFill>
+                  <a:srgbClr val="006699"/>
+                </a:solidFill>
+                <a:latin typeface="Arial" charset="0"/>
+                <a:ea typeface="宋体" pitchFamily="2" charset="-122"/>
+              </a:rPr>
+              <a:t>26.0.1410.43 m </a:t>
+            </a:r>
+            <a:r>
+              <a:rPr lang="en-SG" altLang="zh-CN" sz="2400" b="1" baseline="0" dirty="0">
+                <a:solidFill>
+                  <a:srgbClr val="006699"/>
+                </a:solidFill>
+                <a:latin typeface="Arial" charset="0"/>
+                <a:ea typeface="宋体" pitchFamily="2" charset="-122"/>
+              </a:rPr>
+              <a:t>&amp; 27.0.1453.9 m</a:t>
+            </a:r>
+          </a:p>
+          <a:p>
+            <a:pPr marL="276548" indent="-276548" algn="l" defTabSz="600077">
+              <a:spcBef>
+                <a:spcPct val="50000"/>
+              </a:spcBef>
+              <a:buFont typeface="Wingdings" pitchFamily="2" charset="2"/>
+              <a:buChar char="§"/>
+            </a:pPr>
+            <a:r>
+              <a:rPr lang="en-SG" altLang="zh-CN" sz="2400" b="1" baseline="0" dirty="0">
+                <a:solidFill>
+                  <a:srgbClr val="006699"/>
+                </a:solidFill>
+                <a:latin typeface="Arial" charset="0"/>
+                <a:ea typeface="宋体" pitchFamily="2" charset="-122"/>
+              </a:rPr>
+              <a:t>JavaScript</a:t>
+            </a:r>
+          </a:p>
+          <a:p>
+            <a:pPr marL="276548" indent="-276548" algn="l" defTabSz="600077">
+              <a:spcBef>
+                <a:spcPct val="50000"/>
+              </a:spcBef>
+              <a:buFont typeface="Wingdings" pitchFamily="2" charset="2"/>
+              <a:buChar char="§"/>
+            </a:pPr>
+            <a:r>
+              <a:rPr lang="en-US" altLang="zh-CN" sz="2400" b="1" baseline="0" dirty="0">
+                <a:solidFill>
+                  <a:srgbClr val="006699"/>
+                </a:solidFill>
+                <a:latin typeface="Arial" charset="0"/>
+                <a:ea typeface="宋体" pitchFamily="2" charset="-122"/>
+              </a:rPr>
+              <a:t>Chrome Extension API</a:t>
+            </a:r>
+            <a:endParaRPr lang="en-GB" altLang="zh-CN" sz="2400" b="1" baseline="0" dirty="0">
+              <a:solidFill>
+                <a:srgbClr val="006699"/>
+              </a:solidFill>
+              <a:latin typeface="Arial" charset="0"/>
+              <a:ea typeface="宋体" pitchFamily="2" charset="-122"/>
+            </a:endParaRPr>
+          </a:p>
+          <a:p>
+            <a:pPr marL="584061" lvl="1" indent="-276548" algn="l" defTabSz="600077">
+              <a:spcBef>
+                <a:spcPct val="50000"/>
+              </a:spcBef>
+              <a:buFont typeface="Wingdings" pitchFamily="2" charset="2"/>
+              <a:buChar char="§"/>
+            </a:pPr>
+            <a:r>
+              <a:rPr lang="en-GB" altLang="zh-CN" sz="2400" b="1" baseline="0" dirty="0">
+                <a:solidFill>
+                  <a:srgbClr val="006699"/>
+                </a:solidFill>
+                <a:latin typeface="Arial" charset="0"/>
+                <a:ea typeface="宋体" pitchFamily="2" charset="-122"/>
+              </a:rPr>
+              <a:t>chrome.webRequest</a:t>
+            </a:r>
+            <a:endParaRPr lang="en-GB" altLang="zh-CN" sz="2400" b="1" baseline="0" dirty="0">
+              <a:solidFill>
+                <a:srgbClr val="006699"/>
+              </a:solidFill>
+              <a:latin typeface="Arial" charset="0"/>
+              <a:ea typeface="宋体" pitchFamily="2" charset="-122"/>
+            </a:endParaRPr>
+          </a:p>
+          <a:p>
+            <a:pPr marL="584061" lvl="1" indent="-276548" algn="l" defTabSz="600077">
+              <a:spcBef>
+                <a:spcPct val="50000"/>
+              </a:spcBef>
+              <a:buFont typeface="Wingdings" pitchFamily="2" charset="2"/>
+              <a:buChar char="§"/>
+            </a:pPr>
+            <a:r>
+              <a:rPr lang="en-GB" altLang="zh-CN" sz="2400" b="1" baseline="0" dirty="0">
+                <a:solidFill>
+                  <a:srgbClr val="006699"/>
+                </a:solidFill>
+                <a:latin typeface="Arial" charset="0"/>
+                <a:ea typeface="宋体" pitchFamily="2" charset="-122"/>
+              </a:rPr>
+              <a:t>Content Script</a:t>
+            </a:r>
+            <a:endParaRPr lang="en-US" altLang="zh-CN" sz="2400" b="1" baseline="0" dirty="0">
+              <a:solidFill>
+                <a:srgbClr val="006699"/>
+              </a:solidFill>
+              <a:latin typeface="Arial" charset="0"/>
+              <a:ea typeface="宋体" pitchFamily="2" charset="-122"/>
+            </a:endParaRPr>
+          </a:p>
+          <a:p>
             <a:pPr algn="just" defTabSz="600077">
               <a:spcBef>
                 <a:spcPct val="50000"/>
               </a:spcBef>
             </a:pPr>
-            <a:r>
-              <a:rPr lang="en-GB" altLang="zh-CN" sz="3000" b="1" baseline="0" dirty="0" smtClean="0">
-                <a:solidFill>
-                  <a:srgbClr val="006699"/>
-                </a:solidFill>
-                <a:latin typeface="Arial" charset="0"/>
-                <a:ea typeface="宋体" pitchFamily="2" charset="-122"/>
-              </a:rPr>
-              <a:t>Result</a:t>
-            </a:r>
             <a:endParaRPr lang="en-GB" altLang="zh-CN" sz="3000" b="1" baseline="0" dirty="0">
               <a:solidFill>
                 <a:srgbClr val="006699"/>
@@ -5904,7 +5131,7 @@
           <p:nvPr/>
         </p:nvPicPr>
         <p:blipFill>
-          <a:blip r:embed="rId13" cstate="print"/>
+          <a:blip r:embed="rId3" cstate="print"/>
           <a:srcRect/>
           <a:stretch>
             <a:fillRect/>
@@ -5930,7 +5157,7 @@
           <p:nvPr/>
         </p:nvPicPr>
         <p:blipFill>
-          <a:blip r:embed="rId14" cstate="print"/>
+          <a:blip r:embed="rId4" cstate="print"/>
           <a:srcRect/>
           <a:stretch>
             <a:fillRect/>
@@ -5956,7 +5183,7 @@
           <p:nvPr/>
         </p:nvPicPr>
         <p:blipFill>
-          <a:blip r:embed="rId15" cstate="print"/>
+          <a:blip r:embed="rId5" cstate="print"/>
           <a:srcRect/>
           <a:stretch>
             <a:fillRect/>
@@ -5982,7 +5209,7 @@
           <p:nvPr/>
         </p:nvPicPr>
         <p:blipFill>
-          <a:blip r:embed="rId16" cstate="print"/>
+          <a:blip r:embed="rId6" cstate="print"/>
           <a:srcRect/>
           <a:stretch>
             <a:fillRect/>
@@ -6008,7 +5235,7 @@
           <p:nvPr/>
         </p:nvPicPr>
         <p:blipFill>
-          <a:blip r:embed="rId17" cstate="print"/>
+          <a:blip r:embed="rId7" cstate="print"/>
           <a:srcRect/>
           <a:stretch>
             <a:fillRect/>
@@ -6016,40 +5243,8 @@
         </p:blipFill>
         <p:spPr bwMode="auto">
           <a:xfrm>
-            <a:off x="11784806" y="4255294"/>
-            <a:ext cx="7580026" cy="1409700"/>
-          </a:xfrm>
-          <a:prstGeom prst="rect">
-            <a:avLst/>
-          </a:prstGeom>
-          <a:noFill/>
-          <a:ln w="9525">
-            <a:noFill/>
-            <a:miter lim="800000"/>
-            <a:headEnd/>
-            <a:tailEnd/>
-          </a:ln>
-        </p:spPr>
-      </p:pic>
-      <p:pic>
-        <p:nvPicPr>
-          <p:cNvPr id="1034" name="Picture 10"/>
-          <p:cNvPicPr>
-            <a:picLocks noChangeAspect="1" noChangeArrowheads="1"/>
-          </p:cNvPicPr>
-          <p:nvPr/>
-        </p:nvPicPr>
-        <p:blipFill>
-          <a:blip r:embed="rId18" cstate="print"/>
-          <a:srcRect/>
-          <a:stretch>
-            <a:fillRect/>
-          </a:stretch>
-        </p:blipFill>
-        <p:spPr bwMode="auto">
-          <a:xfrm>
-            <a:off x="10870406" y="7779544"/>
-            <a:ext cx="9105900" cy="2762250"/>
+            <a:off x="23138606" y="8484394"/>
+            <a:ext cx="3790013" cy="704850"/>
           </a:xfrm>
           <a:prstGeom prst="rect">
             <a:avLst/>
@@ -6072,7 +5267,7 @@
           <p:nvPr/>
         </p:nvPicPr>
         <p:blipFill>
-          <a:blip r:embed="rId19">
+          <a:blip r:embed="rId8">
             <a:extLst>
               <a:ext uri="{28A0092B-C50C-407E-A947-70E740481C1C}">
                 <a14:useLocalDpi xmlns:a14="http://schemas.microsoft.com/office/drawing/2010/main" val="0"/>
@@ -6117,63 +5312,49 @@
           </a:extLst>
         </p:spPr>
       </p:pic>
-      <p:pic>
-        <p:nvPicPr>
-          <p:cNvPr id="6" name="Picture 5"/>
-          <p:cNvPicPr>
-            <a:picLocks noChangeAspect="1" noChangeArrowheads="1"/>
-          </p:cNvPicPr>
+      <p:sp>
+        <p:nvSpPr>
+          <p:cNvPr id="23" name="AutoShape 542"/>
+          <p:cNvSpPr>
+            <a:spLocks noChangeArrowheads="1"/>
+          </p:cNvSpPr>
           <p:nvPr/>
-        </p:nvPicPr>
-        <p:blipFill>
-          <a:blip r:embed="rId20">
-            <a:extLst>
-              <a:ext uri="{28A0092B-C50C-407E-A947-70E740481C1C}">
-                <a14:useLocalDpi xmlns:a14="http://schemas.microsoft.com/office/drawing/2010/main" val="0"/>
-              </a:ext>
-            </a:extLst>
-          </a:blip>
-          <a:srcRect/>
-          <a:stretch>
-            <a:fillRect/>
-          </a:stretch>
-        </p:blipFill>
+        </p:nvSpPr>
         <p:spPr bwMode="auto">
           <a:xfrm>
-            <a:off x="21919406" y="4293394"/>
-            <a:ext cx="7324725" cy="2362200"/>
+            <a:off x="10091738" y="10084594"/>
+            <a:ext cx="11142960" cy="10896600"/>
           </a:xfrm>
-          <a:prstGeom prst="rect">
-            <a:avLst/>
+          <a:prstGeom prst="roundRect">
+            <a:avLst>
+              <a:gd name="adj" fmla="val 3856"/>
+            </a:avLst>
           </a:prstGeom>
-          <a:noFill/>
-          <a:ln>
-            <a:noFill/>
+          <a:solidFill>
+            <a:schemeClr val="bg1"/>
+          </a:solidFill>
+          <a:ln w="12700">
+            <a:solidFill>
+              <a:schemeClr val="bg1"/>
+            </a:solidFill>
+            <a:round/>
+            <a:headEnd/>
+            <a:tailEnd/>
           </a:ln>
-          <a:extLst>
-            <a:ext uri="{909E8E84-426E-40DD-AFC4-6F175D3DCCD1}">
-              <a14:hiddenFill xmlns:a14="http://schemas.microsoft.com/office/drawing/2010/main">
-                <a:solidFill>
-                  <a:schemeClr val="accent1"/>
-                </a:solidFill>
-              </a14:hiddenFill>
-            </a:ext>
-            <a:ext uri="{91240B29-F687-4F45-9708-019B960494DF}">
-              <a14:hiddenLine xmlns:a14="http://schemas.microsoft.com/office/drawing/2010/main" w="9525">
-                <a:solidFill>
-                  <a:schemeClr val="tx1"/>
-                </a:solidFill>
-                <a:miter lim="800000"/>
-                <a:headEnd/>
-                <a:tailEnd/>
-              </a14:hiddenLine>
-            </a:ext>
-          </a:extLst>
+          <a:effectLst/>
         </p:spPr>
-      </p:pic>
-      <p:sp>
-        <p:nvSpPr>
-          <p:cNvPr id="25" name="Text Box 541"/>
+        <p:txBody>
+          <a:bodyPr wrap="none" lIns="44811" tIns="22404" rIns="44811" bIns="22404" anchor="ctr"/>
+          <a:lstStyle/>
+          <a:p>
+            <a:pPr defTabSz="538147"/>
+            <a:endParaRPr lang="en-US" dirty="0"/>
+          </a:p>
+        </p:txBody>
+      </p:sp>
+      <p:sp>
+        <p:nvSpPr>
+          <p:cNvPr id="27" name="Text Box 541"/>
           <p:cNvSpPr txBox="1">
             <a:spLocks noChangeArrowheads="1"/>
           </p:cNvSpPr>
@@ -6181,8 +5362,8 @@
         </p:nvSpPr>
         <p:spPr bwMode="auto">
           <a:xfrm>
-            <a:off x="10091738" y="16866393"/>
-            <a:ext cx="11142960" cy="4087317"/>
+            <a:off x="10337006" y="10297171"/>
+            <a:ext cx="10744200" cy="10429875"/>
           </a:xfrm>
           <a:prstGeom prst="rect">
             <a:avLst/>
@@ -6215,91 +5396,39 @@
                 <a:latin typeface="Arial" charset="0"/>
                 <a:ea typeface="宋体" pitchFamily="2" charset="-122"/>
               </a:rPr>
-              <a:t>Implementation</a:t>
-            </a:r>
-          </a:p>
-          <a:p>
-            <a:pPr marL="276548" indent="-276548" algn="just" defTabSz="600077">
-              <a:spcBef>
-                <a:spcPct val="50000"/>
-              </a:spcBef>
-              <a:buFont typeface="Wingdings" pitchFamily="2" charset="2"/>
-              <a:buChar char="§"/>
-            </a:pPr>
-            <a:r>
-              <a:rPr lang="en-GB" altLang="zh-CN" sz="2400" b="1" baseline="0" dirty="0" smtClean="0">
+              <a:t>Our Solution: </a:t>
+            </a:r>
+            <a:r>
+              <a:rPr lang="en-GB" altLang="zh-CN" sz="3000" b="1" baseline="0" dirty="0" smtClean="0">
+                <a:solidFill>
+                  <a:srgbClr val="FFC000"/>
+                </a:solidFill>
+                <a:latin typeface="Arial" charset="0"/>
+                <a:ea typeface="宋体" pitchFamily="2" charset="-122"/>
+              </a:rPr>
+              <a:t>Protect</a:t>
+            </a:r>
+            <a:r>
+              <a:rPr lang="en-GB" altLang="zh-CN" sz="3000" b="1" baseline="0" dirty="0" smtClean="0">
                 <a:solidFill>
                   <a:srgbClr val="006699"/>
                 </a:solidFill>
                 <a:latin typeface="Arial" charset="0"/>
                 <a:ea typeface="宋体" pitchFamily="2" charset="-122"/>
               </a:rPr>
-              <a:t> Browser</a:t>
-            </a:r>
-          </a:p>
-          <a:p>
-            <a:pPr marL="584061" lvl="1" indent="-276548" algn="just" defTabSz="600077">
-              <a:spcBef>
-                <a:spcPct val="50000"/>
-              </a:spcBef>
-              <a:buFont typeface="Wingdings" pitchFamily="2" charset="2"/>
-              <a:buChar char="§"/>
-            </a:pPr>
-            <a:r>
-              <a:rPr lang="en-GB" altLang="zh-CN" sz="2400" b="1" baseline="0" dirty="0" smtClean="0">
+              <a:t> access to unsafe inputs</a:t>
+            </a:r>
+            <a:r>
+              <a:rPr lang="en-GB" altLang="zh-CN" sz="3000" b="1" baseline="0" dirty="0" smtClean="0">
                 <a:solidFill>
                   <a:srgbClr val="006699"/>
                 </a:solidFill>
                 <a:latin typeface="Arial" charset="0"/>
                 <a:ea typeface="宋体" pitchFamily="2" charset="-122"/>
               </a:rPr>
-              <a:t>Google Chrome </a:t>
-            </a:r>
-            <a:r>
-              <a:rPr lang="en-SG" altLang="zh-CN" sz="2400" b="1" baseline="0" dirty="0">
-                <a:solidFill>
-                  <a:srgbClr val="006699"/>
-                </a:solidFill>
-                <a:latin typeface="Arial" charset="0"/>
-                <a:ea typeface="宋体" pitchFamily="2" charset="-122"/>
-              </a:rPr>
-              <a:t>v</a:t>
-            </a:r>
-            <a:r>
-              <a:rPr lang="en-SG" altLang="zh-CN" sz="2400" b="1" baseline="0" dirty="0" smtClean="0">
-                <a:solidFill>
-                  <a:srgbClr val="006699"/>
-                </a:solidFill>
-                <a:latin typeface="Arial" charset="0"/>
-                <a:ea typeface="宋体" pitchFamily="2" charset="-122"/>
-              </a:rPr>
-              <a:t>ersion</a:t>
-            </a:r>
-            <a:r>
-              <a:rPr lang="en-SG" sz="2400" dirty="0" smtClean="0"/>
-              <a:t> </a:t>
-            </a:r>
-            <a:r>
-              <a:rPr lang="en-SG" altLang="zh-CN" sz="2400" b="1" baseline="0" dirty="0" smtClean="0">
-                <a:solidFill>
-                  <a:srgbClr val="006699"/>
-                </a:solidFill>
-                <a:latin typeface="Arial" charset="0"/>
-                <a:ea typeface="宋体" pitchFamily="2" charset="-122"/>
-              </a:rPr>
-              <a:t>26.0.1410.43 m </a:t>
-            </a:r>
-            <a:r>
-              <a:rPr lang="en-SG" altLang="zh-CN" sz="2400" b="1" baseline="0" dirty="0">
-                <a:solidFill>
-                  <a:srgbClr val="006699"/>
-                </a:solidFill>
-                <a:latin typeface="Arial" charset="0"/>
-                <a:ea typeface="宋体" pitchFamily="2" charset="-122"/>
-              </a:rPr>
-              <a:t>&amp; 27.0.1453.9 m</a:t>
-            </a:r>
-            <a:endParaRPr lang="en-SG" altLang="zh-CN" sz="2400" b="1" baseline="0" dirty="0" smtClean="0">
+              <a:t>!</a:t>
+            </a:r>
+            <a:endParaRPr lang="en-GB" altLang="zh-CN" sz="2400" b="1" baseline="0" dirty="0" smtClean="0">
               <a:solidFill>
                 <a:srgbClr val="006699"/>
               </a:solidFill>
@@ -6308,24 +5437,122 @@
             </a:endParaRPr>
           </a:p>
           <a:p>
-            <a:pPr marL="276548" indent="-276548" algn="just" defTabSz="600077">
+            <a:pPr marL="342900" indent="-342900" algn="l" defTabSz="600077">
               <a:spcBef>
                 <a:spcPct val="50000"/>
               </a:spcBef>
-              <a:buFont typeface="Wingdings" pitchFamily="2" charset="2"/>
-              <a:buChar char="§"/>
+              <a:buFontTx/>
+              <a:buChar char="-"/>
             </a:pPr>
             <a:r>
-              <a:rPr lang="en-SG" altLang="zh-CN" sz="2400" b="1" baseline="0" dirty="0" smtClean="0">
+              <a:rPr lang="en-GB" altLang="zh-CN" sz="2400" b="1" baseline="0" dirty="0" smtClean="0">
                 <a:solidFill>
                   <a:srgbClr val="006699"/>
                 </a:solidFill>
                 <a:latin typeface="Arial" charset="0"/>
                 <a:ea typeface="宋体" pitchFamily="2" charset="-122"/>
               </a:rPr>
-              <a:t>JavaScript</a:t>
-            </a:r>
-            <a:endParaRPr lang="en-SG" altLang="zh-CN" sz="2400" b="1" baseline="0" dirty="0" smtClean="0">
+              <a:t>Remove </a:t>
+            </a:r>
+            <a:r>
+              <a:rPr lang="en-GB" altLang="zh-CN" sz="2400" b="1" baseline="0" dirty="0" err="1" smtClean="0">
+                <a:solidFill>
+                  <a:srgbClr val="006699"/>
+                </a:solidFill>
+                <a:latin typeface="Arial" charset="0"/>
+                <a:ea typeface="宋体" pitchFamily="2" charset="-122"/>
+              </a:rPr>
+              <a:t>Referer</a:t>
+            </a:r>
+            <a:r>
+              <a:rPr lang="en-GB" altLang="zh-CN" sz="2400" b="1" baseline="0" dirty="0" smtClean="0">
+                <a:solidFill>
+                  <a:srgbClr val="006699"/>
+                </a:solidFill>
+                <a:latin typeface="Arial" charset="0"/>
+                <a:ea typeface="宋体" pitchFamily="2" charset="-122"/>
+              </a:rPr>
+              <a:t> </a:t>
+            </a:r>
+            <a:r>
+              <a:rPr lang="en-GB" altLang="zh-CN" sz="2400" b="1" baseline="0" dirty="0" smtClean="0">
+                <a:solidFill>
+                  <a:srgbClr val="006699"/>
+                </a:solidFill>
+                <a:latin typeface="Arial" charset="0"/>
+                <a:ea typeface="宋体" pitchFamily="2" charset="-122"/>
+              </a:rPr>
+              <a:t>from HTTP header</a:t>
+            </a:r>
+          </a:p>
+          <a:p>
+            <a:pPr marL="650413" lvl="1" indent="-342900" algn="l" defTabSz="600077">
+              <a:spcBef>
+                <a:spcPct val="50000"/>
+              </a:spcBef>
+              <a:buFontTx/>
+              <a:buChar char="-"/>
+            </a:pPr>
+            <a:r>
+              <a:rPr lang="en-GB" altLang="zh-CN" sz="2400" b="1" baseline="0" dirty="0" smtClean="0">
+                <a:solidFill>
+                  <a:srgbClr val="006699"/>
+                </a:solidFill>
+                <a:latin typeface="Arial" charset="0"/>
+                <a:ea typeface="宋体" pitchFamily="2" charset="-122"/>
+              </a:rPr>
+              <a:t>Intercept and remove by </a:t>
+            </a:r>
+            <a:r>
+              <a:rPr lang="en-GB" altLang="zh-CN" sz="2400" b="1" baseline="0" dirty="0" smtClean="0">
+                <a:solidFill>
+                  <a:srgbClr val="006699"/>
+                </a:solidFill>
+                <a:latin typeface="Arial" charset="0"/>
+                <a:ea typeface="宋体" pitchFamily="2" charset="-122"/>
+              </a:rPr>
+              <a:t>chrome.webRequest</a:t>
+            </a:r>
+            <a:r>
+              <a:rPr lang="en-GB" altLang="zh-CN" sz="2400" b="1" baseline="0" dirty="0" smtClean="0">
+                <a:solidFill>
+                  <a:srgbClr val="006699"/>
+                </a:solidFill>
+                <a:latin typeface="Arial" charset="0"/>
+                <a:ea typeface="宋体" pitchFamily="2" charset="-122"/>
+              </a:rPr>
+              <a:t> API</a:t>
+            </a:r>
+          </a:p>
+          <a:p>
+            <a:pPr marL="342900" indent="-342900" algn="l" defTabSz="600077">
+              <a:spcBef>
+                <a:spcPct val="50000"/>
+              </a:spcBef>
+              <a:buFontTx/>
+              <a:buChar char="-"/>
+            </a:pPr>
+            <a:r>
+              <a:rPr lang="en-GB" altLang="zh-CN" sz="2400" b="1" baseline="0" dirty="0" smtClean="0">
+                <a:solidFill>
+                  <a:srgbClr val="006699"/>
+                </a:solidFill>
+                <a:latin typeface="Arial" charset="0"/>
+                <a:ea typeface="宋体" pitchFamily="2" charset="-122"/>
+              </a:rPr>
+              <a:t>Protect access to unsafe inputs: encode the return value</a:t>
+            </a:r>
+            <a:r>
+              <a:rPr lang="en-GB" altLang="zh-CN" sz="2400" b="1" baseline="0" dirty="0" smtClean="0">
+                <a:solidFill>
+                  <a:srgbClr val="006699"/>
+                </a:solidFill>
+                <a:latin typeface="Arial" charset="0"/>
+                <a:ea typeface="宋体" pitchFamily="2" charset="-122"/>
+              </a:rPr>
+              <a:t>.</a:t>
+            </a:r>
+            <a:endParaRPr lang="en-GB" altLang="zh-CN" sz="2400" b="1" baseline="0" dirty="0" smtClean="0">
               <a:solidFill>
                 <a:srgbClr val="006699"/>
               </a:solidFill>
@@ -6334,23 +5561,13 @@
             </a:endParaRPr>
           </a:p>
           <a:p>
-            <a:pPr marL="276548" indent="-276548" algn="just" defTabSz="600077">
+            <a:pPr marL="342900" indent="-342900" algn="l" defTabSz="600077">
               <a:spcBef>
                 <a:spcPct val="50000"/>
               </a:spcBef>
-              <a:buFont typeface="Wingdings" pitchFamily="2" charset="2"/>
-              <a:buChar char="§"/>
+              <a:buFontTx/>
+              <a:buChar char="-"/>
             </a:pPr>
-            <a:r>
-              <a:rPr lang="en-US" altLang="zh-CN" sz="2400" b="1" baseline="0" dirty="0" smtClean="0">
-                <a:solidFill>
-                  <a:srgbClr val="006699"/>
-                </a:solidFill>
-                <a:latin typeface="Arial" charset="0"/>
-                <a:ea typeface="宋体" pitchFamily="2" charset="-122"/>
-              </a:rPr>
-              <a:t>Chrome Extension API</a:t>
-            </a:r>
             <a:endParaRPr lang="en-GB" altLang="zh-CN" sz="2400" b="1" baseline="0" dirty="0">
               <a:solidFill>
                 <a:srgbClr val="006699"/>
@@ -6360,23 +5577,13 @@
             </a:endParaRPr>
           </a:p>
           <a:p>
-            <a:pPr marL="584061" lvl="1" indent="-276548" algn="just" defTabSz="600077">
+            <a:pPr marL="342900" indent="-342900" algn="l" defTabSz="600077">
               <a:spcBef>
                 <a:spcPct val="50000"/>
               </a:spcBef>
-              <a:buFont typeface="Wingdings" pitchFamily="2" charset="2"/>
-              <a:buChar char="§"/>
+              <a:buFontTx/>
+              <a:buChar char="-"/>
             </a:pPr>
-            <a:r>
-              <a:rPr lang="en-GB" altLang="zh-CN" sz="2400" b="1" baseline="0" dirty="0" err="1" smtClean="0">
-                <a:solidFill>
-                  <a:srgbClr val="006699"/>
-                </a:solidFill>
-                <a:latin typeface="Arial" charset="0"/>
-                <a:ea typeface="宋体" pitchFamily="2" charset="-122"/>
-              </a:rPr>
-              <a:t>chrome.webRequest</a:t>
-            </a:r>
             <a:endParaRPr lang="en-GB" altLang="zh-CN" sz="2400" b="1" baseline="0" dirty="0" smtClean="0">
               <a:solidFill>
                 <a:srgbClr val="006699"/>
@@ -6386,24 +5593,14 @@
             </a:endParaRPr>
           </a:p>
           <a:p>
-            <a:pPr marL="584061" lvl="1" indent="-276548" algn="just" defTabSz="600077">
+            <a:pPr marL="342900" indent="-342900" algn="l" defTabSz="600077">
               <a:spcBef>
                 <a:spcPct val="50000"/>
               </a:spcBef>
-              <a:buFont typeface="Wingdings" pitchFamily="2" charset="2"/>
-              <a:buChar char="§"/>
+              <a:buFontTx/>
+              <a:buChar char="-"/>
             </a:pPr>
-            <a:r>
-              <a:rPr lang="en-GB" altLang="zh-CN" sz="2400" b="1" baseline="0" dirty="0" smtClean="0">
-                <a:solidFill>
-                  <a:srgbClr val="006699"/>
-                </a:solidFill>
-                <a:latin typeface="Arial" charset="0"/>
-                <a:ea typeface="宋体" pitchFamily="2" charset="-122"/>
-              </a:rPr>
-              <a:t>Content Script</a:t>
-            </a:r>
-            <a:endParaRPr lang="en-US" altLang="zh-CN" sz="2400" b="1" baseline="0" dirty="0" smtClean="0">
+            <a:endParaRPr lang="en-GB" altLang="zh-CN" sz="2400" b="1" baseline="0" dirty="0">
               <a:solidFill>
                 <a:srgbClr val="006699"/>
               </a:solidFill>
@@ -6411,8 +5608,770 @@
               <a:ea typeface="宋体" pitchFamily="2" charset="-122"/>
             </a:endParaRPr>
           </a:p>
-        </p:txBody>
-      </p:sp>
+          <a:p>
+            <a:pPr marL="342900" indent="-342900" algn="l" defTabSz="600077">
+              <a:spcBef>
+                <a:spcPct val="50000"/>
+              </a:spcBef>
+              <a:buFontTx/>
+              <a:buChar char="-"/>
+            </a:pPr>
+            <a:endParaRPr lang="en-GB" altLang="zh-CN" sz="2400" b="1" baseline="0" dirty="0" smtClean="0">
+              <a:solidFill>
+                <a:srgbClr val="006699"/>
+              </a:solidFill>
+              <a:latin typeface="Arial" charset="0"/>
+              <a:ea typeface="宋体" pitchFamily="2" charset="-122"/>
+            </a:endParaRPr>
+          </a:p>
+          <a:p>
+            <a:pPr marL="342900" indent="-342900" algn="l" defTabSz="600077">
+              <a:spcBef>
+                <a:spcPct val="50000"/>
+              </a:spcBef>
+              <a:buFontTx/>
+              <a:buChar char="-"/>
+            </a:pPr>
+            <a:endParaRPr lang="en-GB" altLang="zh-CN" sz="2400" b="1" baseline="0" dirty="0">
+              <a:solidFill>
+                <a:srgbClr val="006699"/>
+              </a:solidFill>
+              <a:latin typeface="Arial" charset="0"/>
+              <a:ea typeface="宋体" pitchFamily="2" charset="-122"/>
+            </a:endParaRPr>
+          </a:p>
+          <a:p>
+            <a:pPr marL="650413" lvl="1" indent="-342900" algn="l" defTabSz="600077">
+              <a:spcBef>
+                <a:spcPct val="50000"/>
+              </a:spcBef>
+              <a:buFontTx/>
+              <a:buChar char="-"/>
+            </a:pPr>
+            <a:r>
+              <a:rPr lang="en-GB" altLang="zh-CN" sz="2400" b="1" baseline="0" dirty="0" smtClean="0">
+                <a:solidFill>
+                  <a:srgbClr val="006699"/>
+                </a:solidFill>
+                <a:latin typeface="Arial" charset="0"/>
+                <a:ea typeface="宋体" pitchFamily="2" charset="-122"/>
+              </a:rPr>
+              <a:t>Chrome Content Script</a:t>
+            </a:r>
+          </a:p>
+          <a:p>
+            <a:pPr marL="957925" lvl="2" indent="-342900" algn="l" defTabSz="600077">
+              <a:spcBef>
+                <a:spcPct val="50000"/>
+              </a:spcBef>
+              <a:buFontTx/>
+              <a:buChar char="-"/>
+            </a:pPr>
+            <a:r>
+              <a:rPr lang="en-GB" altLang="zh-CN" sz="2400" b="1" baseline="0" dirty="0" smtClean="0">
+                <a:solidFill>
+                  <a:srgbClr val="006699"/>
+                </a:solidFill>
+                <a:latin typeface="Arial" charset="0"/>
+                <a:ea typeface="宋体" pitchFamily="2" charset="-122"/>
+              </a:rPr>
+              <a:t>Before DOM objects are constructed, inject small amount of JavaScript to…</a:t>
+            </a:r>
+          </a:p>
+          <a:p>
+            <a:pPr marL="1265438" lvl="3" indent="-342900" algn="l" defTabSz="600077">
+              <a:spcBef>
+                <a:spcPct val="50000"/>
+              </a:spcBef>
+              <a:buFontTx/>
+              <a:buChar char="-"/>
+            </a:pPr>
+            <a:r>
+              <a:rPr lang="en-SG" altLang="zh-CN" sz="2400" b="1" baseline="0" dirty="0" smtClean="0">
+                <a:solidFill>
+                  <a:srgbClr val="006699"/>
+                </a:solidFill>
+                <a:latin typeface="Arial" charset="0"/>
+                <a:ea typeface="宋体" pitchFamily="2" charset="-122"/>
+              </a:rPr>
+              <a:t>Override </a:t>
+            </a:r>
+            <a:r>
+              <a:rPr lang="en-SG" altLang="zh-CN" sz="2400" b="1" baseline="0" dirty="0" smtClean="0">
+                <a:solidFill>
+                  <a:srgbClr val="006699"/>
+                </a:solidFill>
+                <a:latin typeface="Courier New" pitchFamily="49" charset="0"/>
+                <a:ea typeface="宋体" pitchFamily="2" charset="-122"/>
+                <a:cs typeface="Courier New" pitchFamily="49" charset="0"/>
+              </a:rPr>
+              <a:t>document.URL</a:t>
+            </a:r>
+            <a:r>
+              <a:rPr lang="en-SG" altLang="zh-CN" sz="2400" b="1" baseline="0" dirty="0" smtClean="0">
+                <a:solidFill>
+                  <a:srgbClr val="006699"/>
+                </a:solidFill>
+                <a:latin typeface="Arial" charset="0"/>
+                <a:ea typeface="宋体" pitchFamily="2" charset="-122"/>
+              </a:rPr>
+              <a:t> getter</a:t>
+            </a:r>
+            <a:endParaRPr lang="en-GB" altLang="zh-CN" sz="2400" b="1" baseline="0" dirty="0">
+              <a:solidFill>
+                <a:srgbClr val="006699"/>
+              </a:solidFill>
+              <a:latin typeface="Arial" charset="0"/>
+              <a:ea typeface="宋体" pitchFamily="2" charset="-122"/>
+            </a:endParaRPr>
+          </a:p>
+          <a:p>
+            <a:pPr marL="1265438" lvl="3" indent="-342900" algn="l" defTabSz="600077">
+              <a:spcBef>
+                <a:spcPct val="50000"/>
+              </a:spcBef>
+              <a:buFontTx/>
+              <a:buChar char="-"/>
+            </a:pPr>
+            <a:r>
+              <a:rPr lang="en-SG" altLang="zh-CN" sz="2400" b="1" baseline="0" dirty="0" smtClean="0">
+                <a:solidFill>
+                  <a:srgbClr val="006699"/>
+                </a:solidFill>
+                <a:latin typeface="Arial" charset="0"/>
+                <a:ea typeface="宋体" pitchFamily="2" charset="-122"/>
+              </a:rPr>
+              <a:t>Override </a:t>
+            </a:r>
+            <a:r>
+              <a:rPr lang="en-SG" altLang="zh-CN" sz="2400" b="1" baseline="0" dirty="0" smtClean="0">
+                <a:solidFill>
+                  <a:srgbClr val="006699"/>
+                </a:solidFill>
+                <a:latin typeface="Courier New" pitchFamily="49" charset="0"/>
+                <a:ea typeface="宋体" pitchFamily="2" charset="-122"/>
+                <a:cs typeface="Courier New" pitchFamily="49" charset="0"/>
+              </a:rPr>
+              <a:t>document.URLUnencoded</a:t>
+            </a:r>
+            <a:r>
+              <a:rPr lang="en-SG" altLang="zh-CN" sz="2400" b="1" baseline="0" dirty="0" smtClean="0">
+                <a:solidFill>
+                  <a:srgbClr val="006699"/>
+                </a:solidFill>
+                <a:latin typeface="Arial" charset="0"/>
+                <a:ea typeface="宋体" pitchFamily="2" charset="-122"/>
+              </a:rPr>
+              <a:t> getter</a:t>
+            </a:r>
+          </a:p>
+          <a:p>
+            <a:pPr marL="1265438" lvl="3" indent="-342900" algn="l" defTabSz="600077">
+              <a:spcBef>
+                <a:spcPct val="50000"/>
+              </a:spcBef>
+              <a:buFontTx/>
+              <a:buChar char="-"/>
+            </a:pPr>
+            <a:r>
+              <a:rPr lang="en-SG" altLang="zh-CN" sz="2400" b="1" baseline="0" dirty="0" smtClean="0">
+                <a:solidFill>
+                  <a:srgbClr val="006699"/>
+                </a:solidFill>
+                <a:latin typeface="Arial" charset="0"/>
+                <a:ea typeface="宋体" pitchFamily="2" charset="-122"/>
+              </a:rPr>
+              <a:t>Protect </a:t>
+            </a:r>
+            <a:r>
+              <a:rPr lang="en-SG" altLang="zh-CN" sz="2400" b="1" baseline="0" dirty="0" smtClean="0">
+                <a:solidFill>
+                  <a:srgbClr val="006699"/>
+                </a:solidFill>
+                <a:latin typeface="Courier New" pitchFamily="49" charset="0"/>
+                <a:ea typeface="宋体" pitchFamily="2" charset="-122"/>
+                <a:cs typeface="Courier New" pitchFamily="49" charset="0"/>
+              </a:rPr>
+              <a:t>document.location</a:t>
+            </a:r>
+            <a:r>
+              <a:rPr lang="en-SG" altLang="zh-CN" sz="2400" b="1" baseline="0" dirty="0" smtClean="0">
+                <a:solidFill>
+                  <a:srgbClr val="006699"/>
+                </a:solidFill>
+                <a:latin typeface="Arial" charset="0"/>
+                <a:ea typeface="宋体" pitchFamily="2" charset="-122"/>
+              </a:rPr>
+              <a:t>:</a:t>
+            </a:r>
+          </a:p>
+          <a:p>
+            <a:pPr marL="1572951" lvl="4" indent="-342900" algn="l" defTabSz="600077">
+              <a:spcBef>
+                <a:spcPct val="50000"/>
+              </a:spcBef>
+              <a:buFontTx/>
+              <a:buChar char="-"/>
+            </a:pPr>
+            <a:r>
+              <a:rPr lang="en-SG" altLang="zh-CN" sz="2400" b="1" baseline="0" dirty="0" smtClean="0">
+                <a:solidFill>
+                  <a:srgbClr val="006699"/>
+                </a:solidFill>
+                <a:latin typeface="Courier New" pitchFamily="49" charset="0"/>
+                <a:ea typeface="宋体" pitchFamily="2" charset="-122"/>
+                <a:cs typeface="Courier New" pitchFamily="49" charset="0"/>
+              </a:rPr>
+              <a:t>document.location.search</a:t>
+            </a:r>
+            <a:r>
+              <a:rPr lang="en-SG" altLang="zh-CN" sz="2400" b="1" baseline="0" dirty="0" smtClean="0">
+                <a:solidFill>
+                  <a:srgbClr val="006699"/>
+                </a:solidFill>
+                <a:latin typeface="Arial" charset="0"/>
+                <a:ea typeface="宋体" pitchFamily="2" charset="-122"/>
+              </a:rPr>
+              <a:t> already encoded</a:t>
+            </a:r>
+          </a:p>
+          <a:p>
+            <a:pPr marL="1572951" lvl="4" indent="-342900" algn="l" defTabSz="600077">
+              <a:spcBef>
+                <a:spcPct val="50000"/>
+              </a:spcBef>
+              <a:buFontTx/>
+              <a:buChar char="-"/>
+            </a:pPr>
+            <a:r>
+              <a:rPr lang="en-SG" altLang="zh-CN" sz="2400" b="1" baseline="0" dirty="0">
+                <a:solidFill>
+                  <a:srgbClr val="006699"/>
+                </a:solidFill>
+                <a:latin typeface="Arial" charset="0"/>
+                <a:ea typeface="宋体" pitchFamily="2" charset="-122"/>
+              </a:rPr>
+              <a:t>O</a:t>
+            </a:r>
+            <a:r>
+              <a:rPr lang="en-SG" altLang="zh-CN" sz="2400" b="1" baseline="0" dirty="0" smtClean="0">
+                <a:solidFill>
+                  <a:srgbClr val="006699"/>
+                </a:solidFill>
+                <a:latin typeface="Arial" charset="0"/>
+                <a:ea typeface="宋体" pitchFamily="2" charset="-122"/>
+              </a:rPr>
+              <a:t>verride </a:t>
+            </a:r>
+            <a:r>
+              <a:rPr lang="en-SG" altLang="zh-CN" sz="2400" b="1" baseline="0" dirty="0" smtClean="0">
+                <a:solidFill>
+                  <a:srgbClr val="006699"/>
+                </a:solidFill>
+                <a:latin typeface="Courier New" pitchFamily="49" charset="0"/>
+                <a:ea typeface="宋体" pitchFamily="2" charset="-122"/>
+                <a:cs typeface="Courier New" pitchFamily="49" charset="0"/>
+              </a:rPr>
+              <a:t>document.location.hash</a:t>
+            </a:r>
+            <a:r>
+              <a:rPr lang="en-SG" altLang="zh-CN" sz="2400" b="1" baseline="0" dirty="0" smtClean="0">
+                <a:solidFill>
+                  <a:srgbClr val="006699"/>
+                </a:solidFill>
+                <a:latin typeface="Arial" charset="0"/>
+                <a:ea typeface="宋体" pitchFamily="2" charset="-122"/>
+              </a:rPr>
+              <a:t> getter</a:t>
+            </a:r>
+          </a:p>
+          <a:p>
+            <a:pPr marL="1265438" lvl="3" indent="-342900" algn="l" defTabSz="600077">
+              <a:spcBef>
+                <a:spcPct val="50000"/>
+              </a:spcBef>
+              <a:buFontTx/>
+              <a:buChar char="-"/>
+            </a:pPr>
+            <a:r>
+              <a:rPr lang="en-SG" altLang="zh-CN" sz="2400" b="1" baseline="0" dirty="0" smtClean="0">
+                <a:solidFill>
+                  <a:srgbClr val="006699"/>
+                </a:solidFill>
+                <a:latin typeface="Arial" charset="0"/>
+                <a:ea typeface="宋体" pitchFamily="2" charset="-122"/>
+              </a:rPr>
+              <a:t>Override </a:t>
+            </a:r>
+            <a:r>
+              <a:rPr lang="en-SG" altLang="zh-CN" sz="2400" b="1" baseline="0" dirty="0" smtClean="0">
+                <a:solidFill>
+                  <a:srgbClr val="006699"/>
+                </a:solidFill>
+                <a:latin typeface="Courier New" pitchFamily="49" charset="0"/>
+                <a:ea typeface="宋体" pitchFamily="2" charset="-122"/>
+                <a:cs typeface="Courier New" pitchFamily="49" charset="0"/>
+              </a:rPr>
+              <a:t>window.name </a:t>
+            </a:r>
+            <a:r>
+              <a:rPr lang="en-SG" altLang="zh-CN" sz="2400" b="1" baseline="0" dirty="0" smtClean="0">
+                <a:solidFill>
+                  <a:srgbClr val="006699"/>
+                </a:solidFill>
+                <a:latin typeface="Arial" charset="0"/>
+                <a:ea typeface="宋体" pitchFamily="2" charset="-122"/>
+              </a:rPr>
+              <a:t>getter</a:t>
+            </a:r>
+          </a:p>
+          <a:p>
+            <a:pPr marL="1265438" lvl="3" indent="-342900" algn="l" defTabSz="600077">
+              <a:spcBef>
+                <a:spcPct val="50000"/>
+              </a:spcBef>
+              <a:buFontTx/>
+              <a:buChar char="-"/>
+            </a:pPr>
+            <a:r>
+              <a:rPr lang="en-SG" altLang="zh-CN" sz="2400" b="1" baseline="0" dirty="0" smtClean="0">
+                <a:solidFill>
+                  <a:srgbClr val="006699"/>
+                </a:solidFill>
+                <a:latin typeface="Arial" charset="0"/>
+                <a:ea typeface="宋体" pitchFamily="2" charset="-122"/>
+              </a:rPr>
+              <a:t>Force encode </a:t>
+            </a:r>
+            <a:r>
+              <a:rPr lang="en-SG" altLang="zh-CN" sz="2400" b="1" baseline="0" dirty="0" smtClean="0">
+                <a:solidFill>
+                  <a:srgbClr val="006699"/>
+                </a:solidFill>
+                <a:latin typeface="Courier New" pitchFamily="49" charset="0"/>
+                <a:ea typeface="宋体" pitchFamily="2" charset="-122"/>
+                <a:cs typeface="Courier New" pitchFamily="49" charset="0"/>
+              </a:rPr>
+              <a:t>window.location.hash</a:t>
+            </a:r>
+            <a:endParaRPr lang="en-GB" altLang="zh-CN" sz="2400" b="1" baseline="0" dirty="0" smtClean="0">
+              <a:solidFill>
+                <a:srgbClr val="006699"/>
+              </a:solidFill>
+              <a:latin typeface="Courier New" pitchFamily="49" charset="0"/>
+              <a:ea typeface="宋体" pitchFamily="2" charset="-122"/>
+              <a:cs typeface="Courier New" pitchFamily="49" charset="0"/>
+            </a:endParaRPr>
+          </a:p>
+        </p:txBody>
+      </p:sp>
+      <p:pic>
+        <p:nvPicPr>
+          <p:cNvPr id="1034" name="Picture 10"/>
+          <p:cNvPicPr>
+            <a:picLocks noChangeAspect="1" noChangeArrowheads="1"/>
+          </p:cNvPicPr>
+          <p:nvPr/>
+        </p:nvPicPr>
+        <p:blipFill>
+          <a:blip r:embed="rId9" cstate="print"/>
+          <a:srcRect/>
+          <a:stretch>
+            <a:fillRect/>
+          </a:stretch>
+        </p:blipFill>
+        <p:spPr bwMode="auto">
+          <a:xfrm>
+            <a:off x="10870406" y="12656344"/>
+            <a:ext cx="9105900" cy="2762250"/>
+          </a:xfrm>
+          <a:prstGeom prst="rect">
+            <a:avLst/>
+          </a:prstGeom>
+          <a:noFill/>
+          <a:ln w="9525">
+            <a:noFill/>
+            <a:miter lim="800000"/>
+            <a:headEnd/>
+            <a:tailEnd/>
+          </a:ln>
+        </p:spPr>
+      </p:pic>
+      <p:pic>
+        <p:nvPicPr>
+          <p:cNvPr id="28" name="Picture 27"/>
+          <p:cNvPicPr>
+            <a:picLocks noChangeAspect="1" noChangeArrowheads="1"/>
+          </p:cNvPicPr>
+          <p:nvPr/>
+        </p:nvPicPr>
+        <p:blipFill>
+          <a:blip r:embed="rId10" cstate="print"/>
+          <a:srcRect/>
+          <a:stretch>
+            <a:fillRect/>
+          </a:stretch>
+        </p:blipFill>
+        <p:spPr bwMode="auto">
+          <a:xfrm>
+            <a:off x="10433993" y="4386313"/>
+            <a:ext cx="10458450" cy="5162550"/>
+          </a:xfrm>
+          <a:prstGeom prst="rect">
+            <a:avLst/>
+          </a:prstGeom>
+          <a:noFill/>
+          <a:ln w="9525">
+            <a:noFill/>
+            <a:miter lim="800000"/>
+            <a:headEnd/>
+            <a:tailEnd/>
+          </a:ln>
+        </p:spPr>
+      </p:pic>
+      <p:sp>
+        <p:nvSpPr>
+          <p:cNvPr id="29" name="Text Box 522"/>
+          <p:cNvSpPr txBox="1">
+            <a:spLocks noChangeArrowheads="1"/>
+          </p:cNvSpPr>
+          <p:nvPr/>
+        </p:nvSpPr>
+        <p:spPr bwMode="auto">
+          <a:xfrm>
+            <a:off x="10407799" y="3455194"/>
+            <a:ext cx="4888185" cy="706965"/>
+          </a:xfrm>
+          <a:prstGeom prst="rect">
+            <a:avLst/>
+          </a:prstGeom>
+          <a:noFill/>
+          <a:ln w="9525" algn="ctr">
+            <a:noFill/>
+            <a:miter lim="800000"/>
+            <a:headEnd/>
+            <a:tailEnd/>
+          </a:ln>
+          <a:effectLst/>
+        </p:spPr>
+        <p:txBody>
+          <a:bodyPr lIns="44811" tIns="22404" rIns="44811" bIns="22404">
+            <a:spAutoFit/>
+          </a:bodyPr>
+          <a:lstStyle/>
+          <a:p>
+            <a:pPr algn="l" defTabSz="538147">
+              <a:spcBef>
+                <a:spcPct val="50000"/>
+              </a:spcBef>
+            </a:pPr>
+            <a:r>
+              <a:rPr lang="en-GB" altLang="zh-CN" sz="3000" b="1" baseline="0" dirty="0" smtClean="0">
+                <a:solidFill>
+                  <a:srgbClr val="006699"/>
+                </a:solidFill>
+                <a:latin typeface="Arial" charset="0"/>
+                <a:ea typeface="宋体" pitchFamily="2" charset="-122"/>
+              </a:rPr>
+              <a:t>Approach </a:t>
+            </a:r>
+            <a:r>
+              <a:rPr lang="en-GB" altLang="zh-CN" sz="3000" b="1" baseline="0" dirty="0">
+                <a:solidFill>
+                  <a:srgbClr val="006699"/>
+                </a:solidFill>
+                <a:latin typeface="Arial" charset="0"/>
+                <a:ea typeface="宋体" pitchFamily="2" charset="-122"/>
+              </a:rPr>
+              <a:t>Overview</a:t>
+            </a:r>
+            <a:endParaRPr lang="en-GB" sz="3000" b="1" baseline="0" dirty="0">
+              <a:solidFill>
+                <a:srgbClr val="006699"/>
+              </a:solidFill>
+              <a:latin typeface="Arial" charset="0"/>
+            </a:endParaRPr>
+          </a:p>
+          <a:p>
+            <a:pPr defTabSz="538147">
+              <a:spcBef>
+                <a:spcPct val="50000"/>
+              </a:spcBef>
+            </a:pPr>
+            <a:endParaRPr lang="en-US" dirty="0"/>
+          </a:p>
+        </p:txBody>
+      </p:sp>
+      <p:pic>
+        <p:nvPicPr>
+          <p:cNvPr id="5" name="Picture 3"/>
+          <p:cNvPicPr>
+            <a:picLocks noChangeAspect="1" noChangeArrowheads="1"/>
+          </p:cNvPicPr>
+          <p:nvPr/>
+        </p:nvPicPr>
+        <p:blipFill>
+          <a:blip r:embed="rId11">
+            <a:extLst>
+              <a:ext uri="{28A0092B-C50C-407E-A947-70E740481C1C}">
+                <a14:useLocalDpi xmlns:a14="http://schemas.microsoft.com/office/drawing/2010/main" val="0"/>
+              </a:ext>
+            </a:extLst>
+          </a:blip>
+          <a:srcRect/>
+          <a:stretch>
+            <a:fillRect/>
+          </a:stretch>
+        </p:blipFill>
+        <p:spPr bwMode="auto">
+          <a:xfrm>
+            <a:off x="21995606" y="17856994"/>
+            <a:ext cx="6858000" cy="1897264"/>
+          </a:xfrm>
+          <a:prstGeom prst="rect">
+            <a:avLst/>
+          </a:prstGeom>
+          <a:noFill/>
+          <a:ln>
+            <a:noFill/>
+          </a:ln>
+          <a:extLst>
+            <a:ext uri="{909E8E84-426E-40DD-AFC4-6F175D3DCCD1}">
+              <a14:hiddenFill xmlns:a14="http://schemas.microsoft.com/office/drawing/2010/main">
+                <a:solidFill>
+                  <a:schemeClr val="accent1"/>
+                </a:solidFill>
+              </a14:hiddenFill>
+            </a:ext>
+            <a:ext uri="{91240B29-F687-4F45-9708-019B960494DF}">
+              <a14:hiddenLine xmlns:a14="http://schemas.microsoft.com/office/drawing/2010/main" w="9525">
+                <a:solidFill>
+                  <a:schemeClr val="tx1"/>
+                </a:solidFill>
+                <a:miter lim="800000"/>
+                <a:headEnd/>
+                <a:tailEnd/>
+              </a14:hiddenLine>
+            </a:ext>
+          </a:extLst>
+        </p:spPr>
+      </p:pic>
+      <p:pic>
+        <p:nvPicPr>
+          <p:cNvPr id="33" name="Picture 5"/>
+          <p:cNvPicPr>
+            <a:picLocks noChangeAspect="1" noChangeArrowheads="1"/>
+          </p:cNvPicPr>
+          <p:nvPr/>
+        </p:nvPicPr>
+        <p:blipFill>
+          <a:blip r:embed="rId12">
+            <a:extLst>
+              <a:ext uri="{28A0092B-C50C-407E-A947-70E740481C1C}">
+                <a14:useLocalDpi xmlns:a14="http://schemas.microsoft.com/office/drawing/2010/main" val="0"/>
+              </a:ext>
+            </a:extLst>
+          </a:blip>
+          <a:srcRect/>
+          <a:stretch>
+            <a:fillRect/>
+          </a:stretch>
+        </p:blipFill>
+        <p:spPr bwMode="auto">
+          <a:xfrm>
+            <a:off x="21995606" y="10529888"/>
+            <a:ext cx="6707187" cy="1266825"/>
+          </a:xfrm>
+          <a:prstGeom prst="rect">
+            <a:avLst/>
+          </a:prstGeom>
+          <a:noFill/>
+          <a:ln>
+            <a:noFill/>
+          </a:ln>
+          <a:extLst>
+            <a:ext uri="{909E8E84-426E-40DD-AFC4-6F175D3DCCD1}">
+              <a14:hiddenFill xmlns:a14="http://schemas.microsoft.com/office/drawing/2010/main">
+                <a:solidFill>
+                  <a:schemeClr val="accent1"/>
+                </a:solidFill>
+              </a14:hiddenFill>
+            </a:ext>
+            <a:ext uri="{91240B29-F687-4F45-9708-019B960494DF}">
+              <a14:hiddenLine xmlns:a14="http://schemas.microsoft.com/office/drawing/2010/main" w="9525">
+                <a:solidFill>
+                  <a:schemeClr val="tx1"/>
+                </a:solidFill>
+                <a:miter lim="800000"/>
+                <a:headEnd/>
+                <a:tailEnd/>
+              </a14:hiddenLine>
+            </a:ext>
+          </a:extLst>
+        </p:spPr>
+      </p:pic>
+      <p:pic>
+        <p:nvPicPr>
+          <p:cNvPr id="1030" name="Picture 6"/>
+          <p:cNvPicPr>
+            <a:picLocks noChangeAspect="1" noChangeArrowheads="1"/>
+          </p:cNvPicPr>
+          <p:nvPr/>
+        </p:nvPicPr>
+        <p:blipFill>
+          <a:blip r:embed="rId13">
+            <a:extLst>
+              <a:ext uri="{28A0092B-C50C-407E-A947-70E740481C1C}">
+                <a14:useLocalDpi xmlns:a14="http://schemas.microsoft.com/office/drawing/2010/main" val="0"/>
+              </a:ext>
+            </a:extLst>
+          </a:blip>
+          <a:srcRect/>
+          <a:stretch>
+            <a:fillRect/>
+          </a:stretch>
+        </p:blipFill>
+        <p:spPr bwMode="auto">
+          <a:xfrm>
+            <a:off x="22294451" y="11803857"/>
+            <a:ext cx="6745287" cy="1314450"/>
+          </a:xfrm>
+          <a:prstGeom prst="rect">
+            <a:avLst/>
+          </a:prstGeom>
+          <a:noFill/>
+          <a:ln>
+            <a:noFill/>
+          </a:ln>
+          <a:extLst>
+            <a:ext uri="{909E8E84-426E-40DD-AFC4-6F175D3DCCD1}">
+              <a14:hiddenFill xmlns:a14="http://schemas.microsoft.com/office/drawing/2010/main">
+                <a:solidFill>
+                  <a:schemeClr val="accent1"/>
+                </a:solidFill>
+              </a14:hiddenFill>
+            </a:ext>
+            <a:ext uri="{91240B29-F687-4F45-9708-019B960494DF}">
+              <a14:hiddenLine xmlns:a14="http://schemas.microsoft.com/office/drawing/2010/main" w="9525">
+                <a:solidFill>
+                  <a:schemeClr val="tx1"/>
+                </a:solidFill>
+                <a:miter lim="800000"/>
+                <a:headEnd/>
+                <a:tailEnd/>
+              </a14:hiddenLine>
+            </a:ext>
+          </a:extLst>
+        </p:spPr>
+      </p:pic>
+      <p:pic>
+        <p:nvPicPr>
+          <p:cNvPr id="1031" name="Picture 7"/>
+          <p:cNvPicPr>
+            <a:picLocks noChangeAspect="1" noChangeArrowheads="1"/>
+          </p:cNvPicPr>
+          <p:nvPr/>
+        </p:nvPicPr>
+        <p:blipFill>
+          <a:blip r:embed="rId14">
+            <a:extLst>
+              <a:ext uri="{28A0092B-C50C-407E-A947-70E740481C1C}">
+                <a14:useLocalDpi xmlns:a14="http://schemas.microsoft.com/office/drawing/2010/main" val="0"/>
+              </a:ext>
+            </a:extLst>
+          </a:blip>
+          <a:srcRect/>
+          <a:stretch>
+            <a:fillRect/>
+          </a:stretch>
+        </p:blipFill>
+        <p:spPr bwMode="auto">
+          <a:xfrm>
+            <a:off x="22605206" y="13118307"/>
+            <a:ext cx="6726237" cy="1600200"/>
+          </a:xfrm>
+          <a:prstGeom prst="rect">
+            <a:avLst/>
+          </a:prstGeom>
+          <a:noFill/>
+          <a:ln>
+            <a:noFill/>
+          </a:ln>
+          <a:extLst>
+            <a:ext uri="{909E8E84-426E-40DD-AFC4-6F175D3DCCD1}">
+              <a14:hiddenFill xmlns:a14="http://schemas.microsoft.com/office/drawing/2010/main">
+                <a:solidFill>
+                  <a:schemeClr val="accent1"/>
+                </a:solidFill>
+              </a14:hiddenFill>
+            </a:ext>
+            <a:ext uri="{91240B29-F687-4F45-9708-019B960494DF}">
+              <a14:hiddenLine xmlns:a14="http://schemas.microsoft.com/office/drawing/2010/main" w="9525">
+                <a:solidFill>
+                  <a:schemeClr val="tx1"/>
+                </a:solidFill>
+                <a:miter lim="800000"/>
+                <a:headEnd/>
+                <a:tailEnd/>
+              </a14:hiddenLine>
+            </a:ext>
+          </a:extLst>
+        </p:spPr>
+      </p:pic>
+      <p:pic>
+        <p:nvPicPr>
+          <p:cNvPr id="9" name="Picture 10"/>
+          <p:cNvPicPr>
+            <a:picLocks noChangeAspect="1" noChangeArrowheads="1"/>
+          </p:cNvPicPr>
+          <p:nvPr/>
+        </p:nvPicPr>
+        <p:blipFill>
+          <a:blip r:embed="rId15">
+            <a:extLst>
+              <a:ext uri="{28A0092B-C50C-407E-A947-70E740481C1C}">
+                <a14:useLocalDpi xmlns:a14="http://schemas.microsoft.com/office/drawing/2010/main" val="0"/>
+              </a:ext>
+            </a:extLst>
+          </a:blip>
+          <a:srcRect/>
+          <a:stretch>
+            <a:fillRect/>
+          </a:stretch>
+        </p:blipFill>
+        <p:spPr bwMode="auto">
+          <a:xfrm>
+            <a:off x="21778119" y="9298781"/>
+            <a:ext cx="6770687" cy="1152525"/>
+          </a:xfrm>
+          <a:prstGeom prst="rect">
+            <a:avLst/>
+          </a:prstGeom>
+          <a:noFill/>
+          <a:ln>
+            <a:noFill/>
+          </a:ln>
+          <a:extLst>
+            <a:ext uri="{909E8E84-426E-40DD-AFC4-6F175D3DCCD1}">
+              <a14:hiddenFill xmlns:a14="http://schemas.microsoft.com/office/drawing/2010/main">
+                <a:solidFill>
+                  <a:schemeClr val="accent1"/>
+                </a:solidFill>
+              </a14:hiddenFill>
+            </a:ext>
+            <a:ext uri="{91240B29-F687-4F45-9708-019B960494DF}">
+              <a14:hiddenLine xmlns:a14="http://schemas.microsoft.com/office/drawing/2010/main" w="9525">
+                <a:solidFill>
+                  <a:schemeClr val="tx1"/>
+                </a:solidFill>
+                <a:miter lim="800000"/>
+                <a:headEnd/>
+                <a:tailEnd/>
+              </a14:hiddenLine>
+            </a:ext>
+          </a:extLst>
+        </p:spPr>
+      </p:pic>
     </p:spTree>
   </p:cSld>
   <p:clrMapOvr>

</xml_diff>